<commit_message>
ready to submit to readers
</commit_message>
<xml_diff>
--- a/images/lifetimeApplications/Dow Co-Host FIgures v3.pptx
+++ b/images/lifetimeApplications/Dow Co-Host FIgures v3.pptx
@@ -271,7 +271,7 @@
           <a:p>
             <a:fld id="{8E238CC0-8EC5-43BD-824E-EDEED67F04D4}" type="datetimeFigureOut">
               <a:rPr lang="en-US" smtClean="0"/>
-              <a:t>6/15/2018</a:t>
+              <a:t>7/8/2018</a:t>
             </a:fld>
             <a:endParaRPr lang="en-US" dirty="0"/>
           </a:p>
@@ -488,7 +488,7 @@
           <a:p>
             <a:fld id="{8E238CC0-8EC5-43BD-824E-EDEED67F04D4}" type="datetimeFigureOut">
               <a:rPr lang="en-US" smtClean="0"/>
-              <a:t>6/15/2018</a:t>
+              <a:t>7/8/2018</a:t>
             </a:fld>
             <a:endParaRPr lang="en-US"/>
           </a:p>
@@ -710,7 +710,7 @@
           <a:p>
             <a:fld id="{8E238CC0-8EC5-43BD-824E-EDEED67F04D4}" type="datetimeFigureOut">
               <a:rPr lang="en-US" smtClean="0"/>
-              <a:t>6/15/2018</a:t>
+              <a:t>7/8/2018</a:t>
             </a:fld>
             <a:endParaRPr lang="en-US"/>
           </a:p>
@@ -932,7 +932,7 @@
           <a:p>
             <a:fld id="{8E238CC0-8EC5-43BD-824E-EDEED67F04D4}" type="datetimeFigureOut">
               <a:rPr lang="en-US" smtClean="0"/>
-              <a:t>6/15/2018</a:t>
+              <a:t>7/8/2018</a:t>
             </a:fld>
             <a:endParaRPr lang="en-US" dirty="0"/>
           </a:p>
@@ -1187,7 +1187,7 @@
           <a:p>
             <a:fld id="{8E238CC0-8EC5-43BD-824E-EDEED67F04D4}" type="datetimeFigureOut">
               <a:rPr lang="en-US" smtClean="0"/>
-              <a:t>6/15/2018</a:t>
+              <a:t>7/8/2018</a:t>
             </a:fld>
             <a:endParaRPr lang="en-US" dirty="0"/>
           </a:p>
@@ -1499,7 +1499,7 @@
           <a:p>
             <a:fld id="{8E238CC0-8EC5-43BD-824E-EDEED67F04D4}" type="datetimeFigureOut">
               <a:rPr lang="en-US" smtClean="0"/>
-              <a:t>6/15/2018</a:t>
+              <a:t>7/8/2018</a:t>
             </a:fld>
             <a:endParaRPr lang="en-US"/>
           </a:p>
@@ -1951,7 +1951,7 @@
           <a:p>
             <a:fld id="{8E238CC0-8EC5-43BD-824E-EDEED67F04D4}" type="datetimeFigureOut">
               <a:rPr lang="en-US" smtClean="0"/>
-              <a:t>6/15/2018</a:t>
+              <a:t>7/8/2018</a:t>
             </a:fld>
             <a:endParaRPr lang="en-US"/>
           </a:p>
@@ -2083,7 +2083,7 @@
           <a:p>
             <a:fld id="{8E238CC0-8EC5-43BD-824E-EDEED67F04D4}" type="datetimeFigureOut">
               <a:rPr lang="en-US" smtClean="0"/>
-              <a:t>6/15/2018</a:t>
+              <a:t>7/8/2018</a:t>
             </a:fld>
             <a:endParaRPr lang="en-US"/>
           </a:p>
@@ -2178,7 +2178,7 @@
           <a:p>
             <a:fld id="{8E238CC0-8EC5-43BD-824E-EDEED67F04D4}" type="datetimeFigureOut">
               <a:rPr lang="en-US" smtClean="0"/>
-              <a:t>6/15/2018</a:t>
+              <a:t>7/8/2018</a:t>
             </a:fld>
             <a:endParaRPr lang="en-US"/>
           </a:p>
@@ -2482,7 +2482,7 @@
           <a:p>
             <a:fld id="{8E238CC0-8EC5-43BD-824E-EDEED67F04D4}" type="datetimeFigureOut">
               <a:rPr lang="en-US" smtClean="0"/>
-              <a:t>6/15/2018</a:t>
+              <a:t>7/8/2018</a:t>
             </a:fld>
             <a:endParaRPr lang="en-US"/>
           </a:p>
@@ -2748,7 +2748,7 @@
           <a:p>
             <a:fld id="{8E238CC0-8EC5-43BD-824E-EDEED67F04D4}" type="datetimeFigureOut">
               <a:rPr lang="en-US" smtClean="0"/>
-              <a:t>6/15/2018</a:t>
+              <a:t>7/8/2018</a:t>
             </a:fld>
             <a:endParaRPr lang="en-US"/>
           </a:p>
@@ -2964,7 +2964,7 @@
             <a:fld id="{8E238CC0-8EC5-43BD-824E-EDEED67F04D4}" type="datetimeFigureOut">
               <a:rPr lang="en-US" smtClean="0"/>
               <a:pPr/>
-              <a:t>6/15/2018</a:t>
+              <a:t>7/8/2018</a:t>
             </a:fld>
             <a:endParaRPr lang="en-US" dirty="0"/>
           </a:p>
@@ -3379,7 +3379,7 @@
           <p:cNvPr id="87" name="Picture 86">
             <a:extLst>
               <a:ext uri="{FF2B5EF4-FFF2-40B4-BE49-F238E27FC236}">
-                <a16:creationId xmlns:a16="http://schemas.microsoft.com/office/drawing/2014/main" xmlns="" id="{F0A6DAEE-24D8-4F83-B632-6B74D0226573}"/>
+                <a16:creationId xmlns="" xmlns:a16="http://schemas.microsoft.com/office/drawing/2014/main" id="{F0A6DAEE-24D8-4F83-B632-6B74D0226573}"/>
               </a:ext>
             </a:extLst>
           </p:cNvPr>
@@ -3396,7 +3396,7 @@
         </p:blipFill>
         <p:spPr>
           <a:xfrm>
-            <a:off x="824951" y="2930958"/>
+            <a:off x="770093" y="3000752"/>
             <a:ext cx="1558067" cy="2206800"/>
           </a:xfrm>
           <a:prstGeom prst="rect">
@@ -3409,7 +3409,7 @@
           <p:cNvPr id="86" name="Picture 85">
             <a:extLst>
               <a:ext uri="{FF2B5EF4-FFF2-40B4-BE49-F238E27FC236}">
-                <a16:creationId xmlns:a16="http://schemas.microsoft.com/office/drawing/2014/main" xmlns="" id="{94208A42-AA3F-4773-A55A-882CCBCD84D1}"/>
+                <a16:creationId xmlns="" xmlns:a16="http://schemas.microsoft.com/office/drawing/2014/main" id="{94208A42-AA3F-4773-A55A-882CCBCD84D1}"/>
               </a:ext>
             </a:extLst>
           </p:cNvPr>
@@ -3439,7 +3439,7 @@
           <p:cNvPr id="84" name="Picture 83">
             <a:extLst>
               <a:ext uri="{FF2B5EF4-FFF2-40B4-BE49-F238E27FC236}">
-                <a16:creationId xmlns:a16="http://schemas.microsoft.com/office/drawing/2014/main" xmlns="" id="{6C663143-C96E-402E-B3B2-114A62B41615}"/>
+                <a16:creationId xmlns="" xmlns:a16="http://schemas.microsoft.com/office/drawing/2014/main" id="{6C663143-C96E-402E-B3B2-114A62B41615}"/>
               </a:ext>
             </a:extLst>
           </p:cNvPr>
@@ -3456,7 +3456,7 @@
         </p:blipFill>
         <p:spPr>
           <a:xfrm>
-            <a:off x="2529630" y="581596"/>
+            <a:off x="2514419" y="589304"/>
             <a:ext cx="3918575" cy="2466000"/>
           </a:xfrm>
           <a:prstGeom prst="rect">
@@ -3469,7 +3469,7 @@
           <p:cNvPr id="15" name="Title 14">
             <a:extLst>
               <a:ext uri="{FF2B5EF4-FFF2-40B4-BE49-F238E27FC236}">
-                <a16:creationId xmlns:a16="http://schemas.microsoft.com/office/drawing/2014/main" xmlns="" id="{AF53EC87-623D-4F3F-BC58-D79178249535}"/>
+                <a16:creationId xmlns="" xmlns:a16="http://schemas.microsoft.com/office/drawing/2014/main" id="{AF53EC87-623D-4F3F-BC58-D79178249535}"/>
               </a:ext>
             </a:extLst>
           </p:cNvPr>
@@ -3504,7 +3504,7 @@
           <p:cNvPr id="67" name="Picture 66">
             <a:extLst>
               <a:ext uri="{FF2B5EF4-FFF2-40B4-BE49-F238E27FC236}">
-                <a16:creationId xmlns:a16="http://schemas.microsoft.com/office/drawing/2014/main" xmlns="" id="{6275A800-5351-4895-A283-9C3D3A0C03FC}"/>
+                <a16:creationId xmlns="" xmlns:a16="http://schemas.microsoft.com/office/drawing/2014/main" id="{6275A800-5351-4895-A283-9C3D3A0C03FC}"/>
               </a:ext>
             </a:extLst>
           </p:cNvPr>
@@ -3521,7 +3521,7 @@
         </p:blipFill>
         <p:spPr>
           <a:xfrm>
-            <a:off x="2946128" y="2949602"/>
+            <a:off x="2985636" y="3006554"/>
             <a:ext cx="3605481" cy="2200998"/>
           </a:xfrm>
           <a:prstGeom prst="rect">
@@ -3534,7 +3534,7 @@
           <p:cNvPr id="65" name="TextBox 64">
             <a:extLst>
               <a:ext uri="{FF2B5EF4-FFF2-40B4-BE49-F238E27FC236}">
-                <a16:creationId xmlns:a16="http://schemas.microsoft.com/office/drawing/2014/main" xmlns="" id="{89226FF1-54F7-4437-88C7-54948870BE25}"/>
+                <a16:creationId xmlns="" xmlns:a16="http://schemas.microsoft.com/office/drawing/2014/main" id="{89226FF1-54F7-4437-88C7-54948870BE25}"/>
               </a:ext>
             </a:extLst>
           </p:cNvPr>
@@ -3543,8 +3543,8 @@
         </p:nvSpPr>
         <p:spPr>
           <a:xfrm>
-            <a:off x="681322" y="725899"/>
-            <a:ext cx="298480" cy="338554"/>
+            <a:off x="643222" y="725899"/>
+            <a:ext cx="436338" cy="338554"/>
           </a:xfrm>
           <a:prstGeom prst="rect">
             <a:avLst/>
@@ -3558,9 +3558,10 @@
           <a:lstStyle/>
           <a:p>
             <a:r>
-              <a:rPr lang="en-US" sz="1600" b="1" dirty="0"/>
-              <a:t>a</a:t>
-            </a:r>
+              <a:rPr lang="en-US" sz="1600" b="1" dirty="0" smtClean="0"/>
+              <a:t>(a)</a:t>
+            </a:r>
+            <a:endParaRPr lang="en-US" sz="1600" b="1" dirty="0"/>
           </a:p>
         </p:txBody>
       </p:sp>
@@ -3569,7 +3570,7 @@
           <p:cNvPr id="77" name="TextBox 76">
             <a:extLst>
               <a:ext uri="{FF2B5EF4-FFF2-40B4-BE49-F238E27FC236}">
-                <a16:creationId xmlns:a16="http://schemas.microsoft.com/office/drawing/2014/main" xmlns="" id="{E6ECB888-D3A2-4997-A121-65612E3CF43C}"/>
+                <a16:creationId xmlns="" xmlns:a16="http://schemas.microsoft.com/office/drawing/2014/main" id="{E6ECB888-D3A2-4997-A121-65612E3CF43C}"/>
               </a:ext>
             </a:extLst>
           </p:cNvPr>
@@ -3578,8 +3579,8 @@
         </p:nvSpPr>
         <p:spPr>
           <a:xfrm>
-            <a:off x="3153089" y="704033"/>
-            <a:ext cx="298480" cy="338554"/>
+            <a:off x="3182142" y="711741"/>
+            <a:ext cx="436338" cy="338554"/>
           </a:xfrm>
           <a:prstGeom prst="rect">
             <a:avLst/>
@@ -3593,9 +3594,10 @@
           <a:lstStyle/>
           <a:p>
             <a:r>
-              <a:rPr lang="en-US" sz="1600" b="1" dirty="0"/>
-              <a:t>c</a:t>
-            </a:r>
+              <a:rPr lang="en-US" sz="1600" b="1" dirty="0" smtClean="0"/>
+              <a:t>(c)</a:t>
+            </a:r>
+            <a:endParaRPr lang="en-US" sz="1600" b="1" dirty="0"/>
           </a:p>
         </p:txBody>
       </p:sp>
@@ -3604,7 +3606,7 @@
           <p:cNvPr id="78" name="TextBox 77">
             <a:extLst>
               <a:ext uri="{FF2B5EF4-FFF2-40B4-BE49-F238E27FC236}">
-                <a16:creationId xmlns:a16="http://schemas.microsoft.com/office/drawing/2014/main" xmlns="" id="{E906A610-430E-4626-A0AD-28A4BA21ADE9}"/>
+                <a16:creationId xmlns="" xmlns:a16="http://schemas.microsoft.com/office/drawing/2014/main" id="{E906A610-430E-4626-A0AD-28A4BA21ADE9}"/>
               </a:ext>
             </a:extLst>
           </p:cNvPr>
@@ -3613,8 +3615,8 @@
         </p:nvSpPr>
         <p:spPr>
           <a:xfrm>
-            <a:off x="5063135" y="704033"/>
-            <a:ext cx="309700" cy="338554"/>
+            <a:off x="5047924" y="711741"/>
+            <a:ext cx="447558" cy="338554"/>
           </a:xfrm>
           <a:prstGeom prst="rect">
             <a:avLst/>
@@ -3628,9 +3630,10 @@
           <a:lstStyle/>
           <a:p>
             <a:r>
-              <a:rPr lang="en-US" sz="1600" b="1" dirty="0"/>
-              <a:t>d</a:t>
-            </a:r>
+              <a:rPr lang="en-US" sz="1600" b="1" dirty="0" smtClean="0"/>
+              <a:t>(d)</a:t>
+            </a:r>
+            <a:endParaRPr lang="en-US" sz="1600" b="1" dirty="0"/>
           </a:p>
         </p:txBody>
       </p:sp>
@@ -3639,7 +3642,7 @@
           <p:cNvPr id="79" name="TextBox 78">
             <a:extLst>
               <a:ext uri="{FF2B5EF4-FFF2-40B4-BE49-F238E27FC236}">
-                <a16:creationId xmlns:a16="http://schemas.microsoft.com/office/drawing/2014/main" xmlns="" id="{DE1BD304-8148-4D82-A142-435EDCABD107}"/>
+                <a16:creationId xmlns="" xmlns:a16="http://schemas.microsoft.com/office/drawing/2014/main" id="{DE1BD304-8148-4D82-A142-435EDCABD107}"/>
               </a:ext>
             </a:extLst>
           </p:cNvPr>
@@ -3648,8 +3651,8 @@
         </p:nvSpPr>
         <p:spPr>
           <a:xfrm>
-            <a:off x="2751052" y="2949711"/>
-            <a:ext cx="298480" cy="338554"/>
+            <a:off x="2886937" y="2908066"/>
+            <a:ext cx="436338" cy="338554"/>
           </a:xfrm>
           <a:prstGeom prst="rect">
             <a:avLst/>
@@ -3663,9 +3666,10 @@
           <a:lstStyle/>
           <a:p>
             <a:r>
-              <a:rPr lang="en-US" sz="1600" b="1" dirty="0"/>
-              <a:t>e</a:t>
-            </a:r>
+              <a:rPr lang="en-US" sz="1600" b="1" dirty="0" smtClean="0"/>
+              <a:t>(e)</a:t>
+            </a:r>
+            <a:endParaRPr lang="en-US" sz="1600" b="1" dirty="0"/>
           </a:p>
         </p:txBody>
       </p:sp>
@@ -3674,7 +3678,7 @@
           <p:cNvPr id="80" name="Title 1">
             <a:extLst>
               <a:ext uri="{FF2B5EF4-FFF2-40B4-BE49-F238E27FC236}">
-                <a16:creationId xmlns:a16="http://schemas.microsoft.com/office/drawing/2014/main" xmlns="" id="{981E40D5-332D-42EA-BAE8-8383B49DE86F}"/>
+                <a16:creationId xmlns="" xmlns:a16="http://schemas.microsoft.com/office/drawing/2014/main" id="{981E40D5-332D-42EA-BAE8-8383B49DE86F}"/>
               </a:ext>
             </a:extLst>
           </p:cNvPr>
@@ -3727,20 +3731,80 @@
       </p:sp>
       <p:sp>
         <p:nvSpPr>
-          <p:cNvPr id="14" name="TextBox 13">
+          <p:cNvPr id="2" name="Rectangle 1">
             <a:extLst>
               <a:ext uri="{FF2B5EF4-FFF2-40B4-BE49-F238E27FC236}">
-                <a16:creationId xmlns:a16="http://schemas.microsoft.com/office/drawing/2014/main" xmlns="" id="{42CDB7AD-0B31-4351-AEAA-6925516899B3}"/>
+                <a16:creationId xmlns="" xmlns:a16="http://schemas.microsoft.com/office/drawing/2014/main" id="{E26A2BF4-94FC-4AFA-A020-37E88B021B1B}"/>
               </a:ext>
             </a:extLst>
           </p:cNvPr>
+          <p:cNvSpPr/>
+          <p:nvPr/>
+        </p:nvSpPr>
+        <p:spPr>
+          <a:xfrm>
+            <a:off x="-4544474" y="966568"/>
+            <a:ext cx="4572000" cy="3416320"/>
+          </a:xfrm>
+          <a:prstGeom prst="rect">
+            <a:avLst/>
+          </a:prstGeom>
+        </p:spPr>
+        <p:txBody>
+          <a:bodyPr>
+            <a:spAutoFit/>
+          </a:bodyPr>
+          <a:lstStyle/>
+          <a:p>
+            <a:r>
+              <a:rPr lang="en-US" dirty="0">
+                <a:latin typeface="Times New Roman" panose="02020603050405020304" pitchFamily="18" charset="0"/>
+                <a:ea typeface="Calibri" panose="020F0502020204030204" pitchFamily="34" charset="0"/>
+              </a:rPr>
+              <a:t>(a) External quantum efficiency (EQE) as a function of current density for various Host A and Host B blend ratios. (b) Peak EQE and turn-on voltage (at 1 cd/m</a:t>
+            </a:r>
+            <a:r>
+              <a:rPr lang="en-US" baseline="30000" dirty="0">
+                <a:latin typeface="Times New Roman" panose="02020603050405020304" pitchFamily="18" charset="0"/>
+                <a:ea typeface="Calibri" panose="020F0502020204030204" pitchFamily="34" charset="0"/>
+              </a:rPr>
+              <a:t>2</a:t>
+            </a:r>
+            <a:r>
+              <a:rPr lang="en-US" dirty="0">
+                <a:latin typeface="Times New Roman" panose="02020603050405020304" pitchFamily="18" charset="0"/>
+                <a:ea typeface="Calibri" panose="020F0502020204030204" pitchFamily="34" charset="0"/>
+              </a:rPr>
+              <a:t>) as a function of host </a:t>
+            </a:r>
+            <a:r>
+              <a:rPr lang="en-US" dirty="0" err="1">
+                <a:latin typeface="Times New Roman" panose="02020603050405020304" pitchFamily="18" charset="0"/>
+                <a:ea typeface="Calibri" panose="020F0502020204030204" pitchFamily="34" charset="0"/>
+              </a:rPr>
+              <a:t>compostion</a:t>
+            </a:r>
+            <a:r>
+              <a:rPr lang="en-US" dirty="0">
+                <a:latin typeface="Times New Roman" panose="02020603050405020304" pitchFamily="18" charset="0"/>
+                <a:ea typeface="Calibri" panose="020F0502020204030204" pitchFamily="34" charset="0"/>
+              </a:rPr>
+              <a:t>. (c) and (d) Current density and luminance as a function of voltage for various host compositions. (e) Energy level schematic illustrating the HOMO, LUMO, and triplet energy levels for the materials used in these devices. The x-axis denotes the layer thicknesses used in these devices, as a function of distance from the HTL/EML interface.</a:t>
+            </a:r>
+            <a:endParaRPr lang="en-US" dirty="0"/>
+          </a:p>
+        </p:txBody>
+      </p:sp>
+      <p:sp>
+        <p:nvSpPr>
+          <p:cNvPr id="4" name="TextBox 3"/>
           <p:cNvSpPr txBox="1"/>
           <p:nvPr/>
         </p:nvSpPr>
         <p:spPr>
           <a:xfrm>
-            <a:off x="670101" y="2834793"/>
-            <a:ext cx="309700" cy="338554"/>
+            <a:off x="491418" y="2908066"/>
+            <a:ext cx="447558" cy="338554"/>
           </a:xfrm>
           <a:prstGeom prst="rect">
             <a:avLst/>
@@ -3754,9 +3818,10 @@
           <a:lstStyle/>
           <a:p>
             <a:r>
-              <a:rPr lang="en-US" sz="1600" b="1" dirty="0"/>
-              <a:t>b</a:t>
-            </a:r>
+              <a:rPr lang="en-US" sz="1600" b="1" dirty="0" smtClean="0"/>
+              <a:t>(b)</a:t>
+            </a:r>
+            <a:endParaRPr lang="en-US" sz="1600" b="1" dirty="0"/>
           </a:p>
         </p:txBody>
       </p:sp>
@@ -3795,7 +3860,7 @@
           <p:cNvPr id="2" name="Title 1">
             <a:extLst>
               <a:ext uri="{FF2B5EF4-FFF2-40B4-BE49-F238E27FC236}">
-                <a16:creationId xmlns:a16="http://schemas.microsoft.com/office/drawing/2014/main" xmlns="" id="{0A222FED-CB3A-4EFB-9A40-14E6DCA60BBC}"/>
+                <a16:creationId xmlns="" xmlns:a16="http://schemas.microsoft.com/office/drawing/2014/main" id="{0A222FED-CB3A-4EFB-9A40-14E6DCA60BBC}"/>
               </a:ext>
             </a:extLst>
           </p:cNvPr>
@@ -3847,7 +3912,7 @@
           <p:cNvPr id="3" name="Object 2">
             <a:extLst>
               <a:ext uri="{FF2B5EF4-FFF2-40B4-BE49-F238E27FC236}">
-                <a16:creationId xmlns:a16="http://schemas.microsoft.com/office/drawing/2014/main" xmlns="" id="{E5FC8077-48E6-4869-A464-1131AD0ADD28}"/>
+                <a16:creationId xmlns="" xmlns:a16="http://schemas.microsoft.com/office/drawing/2014/main" id="{E5FC8077-48E6-4869-A464-1131AD0ADD28}"/>
               </a:ext>
             </a:extLst>
           </p:cNvPr>
@@ -3870,7 +3935,7 @@
           <a:graphicData uri="http://schemas.openxmlformats.org/presentationml/2006/ole">
             <mc:AlternateContent xmlns:mc="http://schemas.openxmlformats.org/markup-compatibility/2006">
               <mc:Choice xmlns:v="urn:schemas-microsoft-com:vml" Requires="v">
-                <p:oleObj spid="_x0000_s8287" name="Graph" r:id="rId3" imgW="731520" imgH="1280160" progId="Origin50.Graph">
+                <p:oleObj spid="_x0000_s8332" name="Graph" r:id="rId3" imgW="731520" imgH="1280160" progId="Origin50.Graph">
                   <p:embed/>
                 </p:oleObj>
               </mc:Choice>
@@ -3882,7 +3947,7 @@
                       <p:cNvPr id="12" name="Object 11">
                         <a:extLst>
                           <a:ext uri="{FF2B5EF4-FFF2-40B4-BE49-F238E27FC236}">
-                            <a16:creationId xmlns:a16="http://schemas.microsoft.com/office/drawing/2014/main" xmlns="" id="{9CDF9CEE-E265-4F0F-8E86-C133BF909FF3}"/>
+                            <a16:creationId xmlns="" xmlns:a16="http://schemas.microsoft.com/office/drawing/2014/main" id="{9CDF9CEE-E265-4F0F-8E86-C133BF909FF3}"/>
                           </a:ext>
                         </a:extLst>
                       </p:cNvPr>
@@ -3916,7 +3981,7 @@
           <p:cNvPr id="4" name="Object 3">
             <a:extLst>
               <a:ext uri="{FF2B5EF4-FFF2-40B4-BE49-F238E27FC236}">
-                <a16:creationId xmlns:a16="http://schemas.microsoft.com/office/drawing/2014/main" xmlns="" id="{250EC6F2-7566-422D-B930-85FE520781A7}"/>
+                <a16:creationId xmlns="" xmlns:a16="http://schemas.microsoft.com/office/drawing/2014/main" id="{250EC6F2-7566-422D-B930-85FE520781A7}"/>
               </a:ext>
             </a:extLst>
           </p:cNvPr>
@@ -3939,7 +4004,7 @@
           <a:graphicData uri="http://schemas.openxmlformats.org/presentationml/2006/ole">
             <mc:AlternateContent xmlns:mc="http://schemas.openxmlformats.org/markup-compatibility/2006">
               <mc:Choice xmlns:v="urn:schemas-microsoft-com:vml" Requires="v">
-                <p:oleObj spid="_x0000_s8288" name="Graph" r:id="rId5" imgW="3920760" imgH="3000960" progId="Origin50.Graph">
+                <p:oleObj spid="_x0000_s8333" name="Graph" r:id="rId5" imgW="3920760" imgH="3000960" progId="Origin50.Graph">
                   <p:embed/>
                 </p:oleObj>
               </mc:Choice>
@@ -3951,7 +4016,7 @@
                       <p:cNvPr id="17" name="Object 16">
                         <a:extLst>
                           <a:ext uri="{FF2B5EF4-FFF2-40B4-BE49-F238E27FC236}">
-                            <a16:creationId xmlns:a16="http://schemas.microsoft.com/office/drawing/2014/main" xmlns="" id="{D8B895A3-B087-41C7-B589-C636133E1185}"/>
+                            <a16:creationId xmlns="" xmlns:a16="http://schemas.microsoft.com/office/drawing/2014/main" id="{D8B895A3-B087-41C7-B589-C636133E1185}"/>
                           </a:ext>
                         </a:extLst>
                       </p:cNvPr>
@@ -3985,7 +4050,7 @@
           <p:cNvPr id="5" name="Object 4">
             <a:extLst>
               <a:ext uri="{FF2B5EF4-FFF2-40B4-BE49-F238E27FC236}">
-                <a16:creationId xmlns:a16="http://schemas.microsoft.com/office/drawing/2014/main" xmlns="" id="{30B3E856-42B7-408C-9BD8-0E09A11270A3}"/>
+                <a16:creationId xmlns="" xmlns:a16="http://schemas.microsoft.com/office/drawing/2014/main" id="{30B3E856-42B7-408C-9BD8-0E09A11270A3}"/>
               </a:ext>
             </a:extLst>
           </p:cNvPr>
@@ -4004,7 +4069,7 @@
           <a:graphicData uri="http://schemas.openxmlformats.org/presentationml/2006/ole">
             <mc:AlternateContent xmlns:mc="http://schemas.openxmlformats.org/markup-compatibility/2006">
               <mc:Choice xmlns:v="urn:schemas-microsoft-com:vml" Requires="v">
-                <p:oleObj spid="_x0000_s8289" name="Graph" r:id="rId7" imgW="2194560" imgH="2926080" progId="Origin50.Graph">
+                <p:oleObj spid="_x0000_s8334" name="Graph" r:id="rId7" imgW="2194560" imgH="2926080" progId="Origin50.Graph">
                   <p:embed/>
                 </p:oleObj>
               </mc:Choice>
@@ -4016,7 +4081,7 @@
                       <p:cNvPr id="21" name="Object 20">
                         <a:extLst>
                           <a:ext uri="{FF2B5EF4-FFF2-40B4-BE49-F238E27FC236}">
-                            <a16:creationId xmlns:a16="http://schemas.microsoft.com/office/drawing/2014/main" xmlns="" id="{0CC44DF0-35D9-4A94-9987-19E3B79CB947}"/>
+                            <a16:creationId xmlns="" xmlns:a16="http://schemas.microsoft.com/office/drawing/2014/main" id="{0CC44DF0-35D9-4A94-9987-19E3B79CB947}"/>
                           </a:ext>
                         </a:extLst>
                       </p:cNvPr>
@@ -4075,68 +4140,12 @@
           <a:chExt cx="0" cy="0"/>
         </a:xfrm>
       </p:grpSpPr>
-      <p:sp>
-        <p:nvSpPr>
-          <p:cNvPr id="2" name="Title 1">
+      <p:pic>
+        <p:nvPicPr>
+          <p:cNvPr id="5" name="Picture 4">
             <a:extLst>
               <a:ext uri="{FF2B5EF4-FFF2-40B4-BE49-F238E27FC236}">
-                <a16:creationId xmlns:a16="http://schemas.microsoft.com/office/drawing/2014/main" xmlns="" id="{EBC35852-A6FE-431B-AFF6-C27E4847D9B5}"/>
-              </a:ext>
-            </a:extLst>
-          </p:cNvPr>
-          <p:cNvSpPr txBox="1">
-            <a:spLocks/>
-          </p:cNvSpPr>
-          <p:nvPr/>
-        </p:nvSpPr>
-        <p:spPr>
-          <a:xfrm>
-            <a:off x="0" y="1"/>
-            <a:ext cx="9144000" cy="733561"/>
-          </a:xfrm>
-          <a:prstGeom prst="rect">
-            <a:avLst/>
-          </a:prstGeom>
-        </p:spPr>
-        <p:txBody>
-          <a:bodyPr/>
-          <a:lstStyle>
-            <a:lvl1pPr algn="l" defTabSz="685800" rtl="0" eaLnBrk="1" latinLnBrk="0" hangingPunct="1">
-              <a:lnSpc>
-                <a:spcPct val="90000"/>
-              </a:lnSpc>
-              <a:spcBef>
-                <a:spcPct val="0"/>
-              </a:spcBef>
-              <a:buNone/>
-              <a:defRPr sz="3200" kern="1200">
-                <a:solidFill>
-                  <a:schemeClr val="tx1"/>
-                </a:solidFill>
-                <a:latin typeface="Arial" panose="020B0604020202020204" pitchFamily="34" charset="0"/>
-                <a:ea typeface="+mj-ea"/>
-                <a:cs typeface="Arial" panose="020B0604020202020204" pitchFamily="34" charset="0"/>
-              </a:defRPr>
-            </a:lvl1pPr>
-          </a:lstStyle>
-          <a:p>
-            <a:r>
-              <a:rPr lang="en-US" dirty="0">
-                <a:solidFill>
-                  <a:srgbClr val="920000"/>
-                </a:solidFill>
-              </a:rPr>
-              <a:t>Figure 2. 10 nm EML Lifetimes</a:t>
-            </a:r>
-          </a:p>
-        </p:txBody>
-      </p:sp>
-      <p:pic>
-        <p:nvPicPr>
-          <p:cNvPr id="8" name="Picture 7">
-            <a:extLst>
-              <a:ext uri="{FF2B5EF4-FFF2-40B4-BE49-F238E27FC236}">
-                <a16:creationId xmlns:a16="http://schemas.microsoft.com/office/drawing/2014/main" xmlns="" id="{997AE49C-2D72-4E11-91C5-12FAEDFAA8D4}"/>
+                <a16:creationId xmlns="" xmlns:a16="http://schemas.microsoft.com/office/drawing/2014/main" id="{C75A10C2-EE7E-4DE8-9297-0763A4F41777}"/>
               </a:ext>
             </a:extLst>
           </p:cNvPr>
@@ -4159,24 +4168,122 @@
         </p:blipFill>
         <p:spPr>
           <a:xfrm>
-            <a:off x="1851653" y="2466181"/>
-            <a:ext cx="6464821" cy="3425959"/>
+            <a:off x="516835" y="1166442"/>
+            <a:ext cx="2908706" cy="2655427"/>
           </a:xfrm>
           <a:prstGeom prst="rect">
             <a:avLst/>
           </a:prstGeom>
         </p:spPr>
       </p:pic>
-      <p:sp>
-        <p:nvSpPr>
-          <p:cNvPr id="6" name="TextBox 5"/>
+      <p:pic>
+        <p:nvPicPr>
+          <p:cNvPr id="11" name="Picture 10">
+            <a:extLst>
+              <a:ext uri="{FF2B5EF4-FFF2-40B4-BE49-F238E27FC236}">
+                <a16:creationId xmlns="" xmlns:a16="http://schemas.microsoft.com/office/drawing/2014/main" id="{1BE25D1C-4826-A847-A473-4C7AAC473461}"/>
+              </a:ext>
+            </a:extLst>
+          </p:cNvPr>
+          <p:cNvPicPr>
+            <a:picLocks noChangeAspect="1"/>
+          </p:cNvPicPr>
+          <p:nvPr/>
+        </p:nvPicPr>
+        <p:blipFill>
+          <a:blip r:embed="rId3" cstate="print">
+            <a:extLst>
+              <a:ext uri="{28A0092B-C50C-407E-A947-70E740481C1C}">
+                <a14:useLocalDpi xmlns:a14="http://schemas.microsoft.com/office/drawing/2010/main" val="0"/>
+              </a:ext>
+            </a:extLst>
+          </a:blip>
+          <a:stretch>
+            <a:fillRect/>
+          </a:stretch>
+        </p:blipFill>
+        <p:spPr>
+          <a:xfrm>
+            <a:off x="626961" y="3768861"/>
+            <a:ext cx="2715524" cy="2327592"/>
+          </a:xfrm>
+          <a:prstGeom prst="rect">
+            <a:avLst/>
+          </a:prstGeom>
+        </p:spPr>
+      </p:pic>
+      <p:sp>
+        <p:nvSpPr>
+          <p:cNvPr id="2" name="Title 1">
+            <a:extLst>
+              <a:ext uri="{FF2B5EF4-FFF2-40B4-BE49-F238E27FC236}">
+                <a16:creationId xmlns="" xmlns:a16="http://schemas.microsoft.com/office/drawing/2014/main" id="{EBC35852-A6FE-431B-AFF6-C27E4847D9B5}"/>
+              </a:ext>
+            </a:extLst>
+          </p:cNvPr>
+          <p:cNvSpPr txBox="1">
+            <a:spLocks/>
+          </p:cNvSpPr>
+          <p:nvPr/>
+        </p:nvSpPr>
+        <p:spPr>
+          <a:xfrm>
+            <a:off x="0" y="1"/>
+            <a:ext cx="9144000" cy="733561"/>
+          </a:xfrm>
+          <a:prstGeom prst="rect">
+            <a:avLst/>
+          </a:prstGeom>
+        </p:spPr>
+        <p:txBody>
+          <a:bodyPr/>
+          <a:lstStyle>
+            <a:lvl1pPr algn="l" defTabSz="685800" rtl="0" eaLnBrk="1" latinLnBrk="0" hangingPunct="1">
+              <a:lnSpc>
+                <a:spcPct val="90000"/>
+              </a:lnSpc>
+              <a:spcBef>
+                <a:spcPct val="0"/>
+              </a:spcBef>
+              <a:buNone/>
+              <a:defRPr sz="3200" kern="1200">
+                <a:solidFill>
+                  <a:schemeClr val="tx1"/>
+                </a:solidFill>
+                <a:latin typeface="Arial" panose="020B0604020202020204" pitchFamily="34" charset="0"/>
+                <a:ea typeface="+mj-ea"/>
+                <a:cs typeface="Arial" panose="020B0604020202020204" pitchFamily="34" charset="0"/>
+              </a:defRPr>
+            </a:lvl1pPr>
+          </a:lstStyle>
+          <a:p>
+            <a:r>
+              <a:rPr lang="en-US" dirty="0">
+                <a:solidFill>
+                  <a:srgbClr val="920000"/>
+                </a:solidFill>
+              </a:rPr>
+              <a:t>Figure 2. 10 nm EML Lifetimes</a:t>
+            </a:r>
+          </a:p>
+        </p:txBody>
+      </p:sp>
+      <p:sp>
+        <p:nvSpPr>
+          <p:cNvPr id="20" name="TextBox 19">
+            <a:extLst>
+              <a:ext uri="{FF2B5EF4-FFF2-40B4-BE49-F238E27FC236}">
+                <a16:creationId xmlns="" xmlns:a16="http://schemas.microsoft.com/office/drawing/2014/main" id="{E4A3F754-575D-4A9C-AE45-8A29F72536C1}"/>
+              </a:ext>
+            </a:extLst>
+          </p:cNvPr>
           <p:cNvSpPr txBox="1"/>
           <p:nvPr/>
         </p:nvSpPr>
         <p:spPr>
           <a:xfrm>
-            <a:off x="1618256" y="2464395"/>
-            <a:ext cx="466794" cy="369332"/>
+            <a:off x="464100" y="1194829"/>
+            <a:ext cx="436338" cy="338554"/>
           </a:xfrm>
           <a:prstGeom prst="rect">
             <a:avLst/>
@@ -4190,7 +4297,7 @@
           <a:lstStyle/>
           <a:p>
             <a:r>
-              <a:rPr lang="en-US" dirty="0"/>
+              <a:rPr lang="en-US" sz="1600" b="1" dirty="0"/>
               <a:t>(a)</a:t>
             </a:r>
           </a:p>
@@ -4198,14 +4305,20 @@
       </p:sp>
       <p:sp>
         <p:nvSpPr>
-          <p:cNvPr id="7" name="TextBox 6"/>
+          <p:cNvPr id="21" name="TextBox 20">
+            <a:extLst>
+              <a:ext uri="{FF2B5EF4-FFF2-40B4-BE49-F238E27FC236}">
+                <a16:creationId xmlns="" xmlns:a16="http://schemas.microsoft.com/office/drawing/2014/main" id="{D8110172-A573-4CAA-9BF9-03D08418F7EB}"/>
+              </a:ext>
+            </a:extLst>
+          </p:cNvPr>
           <p:cNvSpPr txBox="1"/>
           <p:nvPr/>
         </p:nvSpPr>
         <p:spPr>
           <a:xfrm>
-            <a:off x="4952453" y="2464395"/>
-            <a:ext cx="466794" cy="369332"/>
+            <a:off x="462205" y="3590062"/>
+            <a:ext cx="447558" cy="338554"/>
           </a:xfrm>
           <a:prstGeom prst="rect">
             <a:avLst/>
@@ -4219,7 +4332,149 @@
           <a:lstStyle/>
           <a:p>
             <a:r>
-              <a:rPr lang="en-US" dirty="0"/>
+              <a:rPr lang="en-US" sz="1600" b="1" dirty="0"/>
+              <a:t>(b)</a:t>
+            </a:r>
+          </a:p>
+        </p:txBody>
+      </p:sp>
+      <p:pic>
+        <p:nvPicPr>
+          <p:cNvPr id="9" name="Picture 8">
+            <a:extLst>
+              <a:ext uri="{FF2B5EF4-FFF2-40B4-BE49-F238E27FC236}">
+                <a16:creationId xmlns="" xmlns:a16="http://schemas.microsoft.com/office/drawing/2014/main" id="{95A168BD-B870-43AC-A4D1-2742F6BD843C}"/>
+              </a:ext>
+            </a:extLst>
+          </p:cNvPr>
+          <p:cNvPicPr>
+            <a:picLocks noChangeAspect="1"/>
+          </p:cNvPicPr>
+          <p:nvPr/>
+        </p:nvPicPr>
+        <p:blipFill>
+          <a:blip r:embed="rId4" cstate="print">
+            <a:extLst>
+              <a:ext uri="{28A0092B-C50C-407E-A947-70E740481C1C}">
+                <a14:useLocalDpi xmlns:a14="http://schemas.microsoft.com/office/drawing/2010/main" val="0"/>
+              </a:ext>
+            </a:extLst>
+          </a:blip>
+          <a:stretch>
+            <a:fillRect/>
+          </a:stretch>
+        </p:blipFill>
+        <p:spPr>
+          <a:xfrm>
+            <a:off x="4075044" y="1503045"/>
+            <a:ext cx="2851016" cy="2344052"/>
+          </a:xfrm>
+          <a:prstGeom prst="rect">
+            <a:avLst/>
+          </a:prstGeom>
+        </p:spPr>
+      </p:pic>
+      <p:pic>
+        <p:nvPicPr>
+          <p:cNvPr id="10" name="Picture 9">
+            <a:extLst>
+              <a:ext uri="{FF2B5EF4-FFF2-40B4-BE49-F238E27FC236}">
+                <a16:creationId xmlns="" xmlns:a16="http://schemas.microsoft.com/office/drawing/2014/main" id="{0F0D6010-478F-4C23-92F9-8CB29C4A9146}"/>
+              </a:ext>
+            </a:extLst>
+          </p:cNvPr>
+          <p:cNvPicPr>
+            <a:picLocks noChangeAspect="1"/>
+          </p:cNvPicPr>
+          <p:nvPr/>
+        </p:nvPicPr>
+        <p:blipFill>
+          <a:blip r:embed="rId3" cstate="print">
+            <a:extLst>
+              <a:ext uri="{28A0092B-C50C-407E-A947-70E740481C1C}">
+                <a14:useLocalDpi xmlns:a14="http://schemas.microsoft.com/office/drawing/2010/main" val="0"/>
+              </a:ext>
+            </a:extLst>
+          </a:blip>
+          <a:stretch>
+            <a:fillRect/>
+          </a:stretch>
+        </p:blipFill>
+        <p:spPr>
+          <a:xfrm>
+            <a:off x="4171918" y="3797248"/>
+            <a:ext cx="2715524" cy="2327592"/>
+          </a:xfrm>
+          <a:prstGeom prst="rect">
+            <a:avLst/>
+          </a:prstGeom>
+        </p:spPr>
+      </p:pic>
+      <p:sp>
+        <p:nvSpPr>
+          <p:cNvPr id="12" name="TextBox 11">
+            <a:extLst>
+              <a:ext uri="{FF2B5EF4-FFF2-40B4-BE49-F238E27FC236}">
+                <a16:creationId xmlns="" xmlns:a16="http://schemas.microsoft.com/office/drawing/2014/main" id="{15088760-9B2F-4214-8DEB-6C6FCCDAB884}"/>
+              </a:ext>
+            </a:extLst>
+          </p:cNvPr>
+          <p:cNvSpPr txBox="1"/>
+          <p:nvPr/>
+        </p:nvSpPr>
+        <p:spPr>
+          <a:xfrm>
+            <a:off x="3953749" y="1364602"/>
+            <a:ext cx="436338" cy="338554"/>
+          </a:xfrm>
+          <a:prstGeom prst="rect">
+            <a:avLst/>
+          </a:prstGeom>
+          <a:noFill/>
+        </p:spPr>
+        <p:txBody>
+          <a:bodyPr wrap="none" rtlCol="0">
+            <a:spAutoFit/>
+          </a:bodyPr>
+          <a:lstStyle/>
+          <a:p>
+            <a:r>
+              <a:rPr lang="en-US" sz="1600" b="1" dirty="0"/>
+              <a:t>(a)</a:t>
+            </a:r>
+          </a:p>
+        </p:txBody>
+      </p:sp>
+      <p:sp>
+        <p:nvSpPr>
+          <p:cNvPr id="13" name="TextBox 12">
+            <a:extLst>
+              <a:ext uri="{FF2B5EF4-FFF2-40B4-BE49-F238E27FC236}">
+                <a16:creationId xmlns="" xmlns:a16="http://schemas.microsoft.com/office/drawing/2014/main" id="{F08811CF-B089-46D2-8507-65D3BC804658}"/>
+              </a:ext>
+            </a:extLst>
+          </p:cNvPr>
+          <p:cNvSpPr txBox="1"/>
+          <p:nvPr/>
+        </p:nvSpPr>
+        <p:spPr>
+          <a:xfrm>
+            <a:off x="3953749" y="3677820"/>
+            <a:ext cx="447558" cy="338554"/>
+          </a:xfrm>
+          <a:prstGeom prst="rect">
+            <a:avLst/>
+          </a:prstGeom>
+          <a:noFill/>
+        </p:spPr>
+        <p:txBody>
+          <a:bodyPr wrap="none" rtlCol="0">
+            <a:spAutoFit/>
+          </a:bodyPr>
+          <a:lstStyle/>
+          <a:p>
+            <a:r>
+              <a:rPr lang="en-US" sz="1600" b="1" dirty="0"/>
               <a:t>(b)</a:t>
             </a:r>
           </a:p>
@@ -4257,10 +4512,10 @@
       </p:grpSpPr>
       <p:pic>
         <p:nvPicPr>
-          <p:cNvPr id="33" name="Picture 32">
+          <p:cNvPr id="26" name="Picture 25">
             <a:extLst>
               <a:ext uri="{FF2B5EF4-FFF2-40B4-BE49-F238E27FC236}">
-                <a16:creationId xmlns:a16="http://schemas.microsoft.com/office/drawing/2014/main" xmlns="" id="{CD36C9AF-B004-467C-9946-FE7ECC3DFFFB}"/>
+                <a16:creationId xmlns="" xmlns:a16="http://schemas.microsoft.com/office/drawing/2014/main" id="{88AC599C-35F6-44C6-9EF6-C41CDD38DC8A}"/>
               </a:ext>
             </a:extLst>
           </p:cNvPr>
@@ -4277,7 +4532,7 @@
         </p:blipFill>
         <p:spPr>
           <a:xfrm>
-            <a:off x="4971066" y="3588695"/>
+            <a:off x="925979" y="602863"/>
             <a:ext cx="3837825" cy="2930400"/>
           </a:xfrm>
           <a:prstGeom prst="rect">
@@ -4287,10 +4542,10 @@
       </p:pic>
       <p:pic>
         <p:nvPicPr>
-          <p:cNvPr id="26" name="Picture 25">
+          <p:cNvPr id="24" name="Picture 23">
             <a:extLst>
               <a:ext uri="{FF2B5EF4-FFF2-40B4-BE49-F238E27FC236}">
-                <a16:creationId xmlns:a16="http://schemas.microsoft.com/office/drawing/2014/main" xmlns="" id="{88AC599C-35F6-44C6-9EF6-C41CDD38DC8A}"/>
+                <a16:creationId xmlns="" xmlns:a16="http://schemas.microsoft.com/office/drawing/2014/main" id="{83BCFA04-D7A1-4B39-A4C6-A827BD10909D}"/>
               </a:ext>
             </a:extLst>
           </p:cNvPr>
@@ -4307,37 +4562,7 @@
         </p:blipFill>
         <p:spPr>
           <a:xfrm>
-            <a:off x="4951879" y="3588695"/>
-            <a:ext cx="3837825" cy="2930400"/>
-          </a:xfrm>
-          <a:prstGeom prst="rect">
-            <a:avLst/>
-          </a:prstGeom>
-        </p:spPr>
-      </p:pic>
-      <p:pic>
-        <p:nvPicPr>
-          <p:cNvPr id="24" name="Picture 23">
-            <a:extLst>
-              <a:ext uri="{FF2B5EF4-FFF2-40B4-BE49-F238E27FC236}">
-                <a16:creationId xmlns:a16="http://schemas.microsoft.com/office/drawing/2014/main" xmlns="" id="{83BCFA04-D7A1-4B39-A4C6-A827BD10909D}"/>
-              </a:ext>
-            </a:extLst>
-          </p:cNvPr>
-          <p:cNvPicPr>
-            <a:picLocks noChangeAspect="1"/>
-          </p:cNvPicPr>
-          <p:nvPr/>
-        </p:nvPicPr>
-        <p:blipFill>
-          <a:blip r:embed="rId4"/>
-          <a:stretch>
-            <a:fillRect/>
-          </a:stretch>
-        </p:blipFill>
-        <p:spPr>
-          <a:xfrm>
-            <a:off x="4932692" y="817258"/>
+            <a:off x="924452" y="3595516"/>
             <a:ext cx="3839352" cy="2836768"/>
           </a:xfrm>
           <a:prstGeom prst="rect">
@@ -4353,7 +4578,7 @@
         </p:nvGrpSpPr>
         <p:grpSpPr>
           <a:xfrm>
-            <a:off x="9386260" y="1352524"/>
+            <a:off x="5524434" y="1174036"/>
             <a:ext cx="2151779" cy="2018903"/>
             <a:chOff x="6472322" y="199529"/>
             <a:chExt cx="2523698" cy="3002222"/>
@@ -4364,7 +4589,7 @@
             <p:cNvPr id="9" name="Group 8">
               <a:extLst>
                 <a:ext uri="{FF2B5EF4-FFF2-40B4-BE49-F238E27FC236}">
-                  <a16:creationId xmlns:a16="http://schemas.microsoft.com/office/drawing/2014/main" xmlns="" id="{B33261B4-3A9A-4B01-9BEE-855B3468AA5B}"/>
+                  <a16:creationId xmlns="" xmlns:a16="http://schemas.microsoft.com/office/drawing/2014/main" id="{B33261B4-3A9A-4B01-9BEE-855B3468AA5B}"/>
                 </a:ext>
               </a:extLst>
             </p:cNvPr>
@@ -4384,7 +4609,7 @@
               <p:cNvPr id="11" name="Rectangle 10">
                 <a:extLst>
                   <a:ext uri="{FF2B5EF4-FFF2-40B4-BE49-F238E27FC236}">
-                    <a16:creationId xmlns:a16="http://schemas.microsoft.com/office/drawing/2014/main" xmlns="" id="{C4067397-9313-4DE1-A809-CF5E7D0098BC}"/>
+                    <a16:creationId xmlns="" xmlns:a16="http://schemas.microsoft.com/office/drawing/2014/main" id="{C4067397-9313-4DE1-A809-CF5E7D0098BC}"/>
                   </a:ext>
                 </a:extLst>
               </p:cNvPr>
@@ -4570,7 +4795,7 @@
               <p:cNvPr id="12" name="Rectangle 11">
                 <a:extLst>
                   <a:ext uri="{FF2B5EF4-FFF2-40B4-BE49-F238E27FC236}">
-                    <a16:creationId xmlns:a16="http://schemas.microsoft.com/office/drawing/2014/main" xmlns="" id="{AB49AFCD-2588-4EF9-B5B4-3D913638683C}"/>
+                    <a16:creationId xmlns="" xmlns:a16="http://schemas.microsoft.com/office/drawing/2014/main" id="{AB49AFCD-2588-4EF9-B5B4-3D913638683C}"/>
                   </a:ext>
                 </a:extLst>
               </p:cNvPr>
@@ -4724,7 +4949,7 @@
               <p:cNvPr id="13" name="Rectangle 12">
                 <a:extLst>
                   <a:ext uri="{FF2B5EF4-FFF2-40B4-BE49-F238E27FC236}">
-                    <a16:creationId xmlns:a16="http://schemas.microsoft.com/office/drawing/2014/main" xmlns="" id="{C2E4332A-8690-42CA-BBF4-D561B1BD979B}"/>
+                    <a16:creationId xmlns="" xmlns:a16="http://schemas.microsoft.com/office/drawing/2014/main" id="{C2E4332A-8690-42CA-BBF4-D561B1BD979B}"/>
                   </a:ext>
                 </a:extLst>
               </p:cNvPr>
@@ -4881,7 +5106,7 @@
               <p:cNvPr id="14" name="Rectangle 13">
                 <a:extLst>
                   <a:ext uri="{FF2B5EF4-FFF2-40B4-BE49-F238E27FC236}">
-                    <a16:creationId xmlns:a16="http://schemas.microsoft.com/office/drawing/2014/main" xmlns="" id="{988CE560-CC28-429D-BD4D-7F4150021676}"/>
+                    <a16:creationId xmlns="" xmlns:a16="http://schemas.microsoft.com/office/drawing/2014/main" id="{988CE560-CC28-429D-BD4D-7F4150021676}"/>
                   </a:ext>
                 </a:extLst>
               </p:cNvPr>
@@ -5039,7 +5264,7 @@
               <p:cNvPr id="15" name="Rectangle 14">
                 <a:extLst>
                   <a:ext uri="{FF2B5EF4-FFF2-40B4-BE49-F238E27FC236}">
-                    <a16:creationId xmlns:a16="http://schemas.microsoft.com/office/drawing/2014/main" xmlns="" id="{3A7494E7-3C12-42DE-B3F3-4C65FD864921}"/>
+                    <a16:creationId xmlns="" xmlns:a16="http://schemas.microsoft.com/office/drawing/2014/main" id="{3A7494E7-3C12-42DE-B3F3-4C65FD864921}"/>
                   </a:ext>
                 </a:extLst>
               </p:cNvPr>
@@ -5194,7 +5419,7 @@
             <p:cNvPr id="10" name="Rectangle 9">
               <a:extLst>
                 <a:ext uri="{FF2B5EF4-FFF2-40B4-BE49-F238E27FC236}">
-                  <a16:creationId xmlns:a16="http://schemas.microsoft.com/office/drawing/2014/main" xmlns="" id="{C2E4332A-8690-42CA-BBF4-D561B1BD979B}"/>
+                  <a16:creationId xmlns="" xmlns:a16="http://schemas.microsoft.com/office/drawing/2014/main" id="{C2E4332A-8690-42CA-BBF4-D561B1BD979B}"/>
                 </a:ext>
               </a:extLst>
             </p:cNvPr>
@@ -5355,7 +5580,7 @@
         </p:nvGrpSpPr>
         <p:grpSpPr>
           <a:xfrm>
-            <a:off x="9325132" y="3741690"/>
+            <a:off x="5463306" y="3563202"/>
             <a:ext cx="2217256" cy="2018903"/>
             <a:chOff x="6336929" y="592152"/>
             <a:chExt cx="2522072" cy="3012271"/>
@@ -5366,7 +5591,7 @@
             <p:cNvPr id="17" name="Group 16">
               <a:extLst>
                 <a:ext uri="{FF2B5EF4-FFF2-40B4-BE49-F238E27FC236}">
-                  <a16:creationId xmlns:a16="http://schemas.microsoft.com/office/drawing/2014/main" xmlns="" id="{B33261B4-3A9A-4B01-9BEE-855B3468AA5B}"/>
+                  <a16:creationId xmlns="" xmlns:a16="http://schemas.microsoft.com/office/drawing/2014/main" id="{B33261B4-3A9A-4B01-9BEE-855B3468AA5B}"/>
                 </a:ext>
               </a:extLst>
             </p:cNvPr>
@@ -5386,7 +5611,7 @@
               <p:cNvPr id="19" name="Rectangle 18">
                 <a:extLst>
                   <a:ext uri="{FF2B5EF4-FFF2-40B4-BE49-F238E27FC236}">
-                    <a16:creationId xmlns:a16="http://schemas.microsoft.com/office/drawing/2014/main" xmlns="" id="{C4067397-9313-4DE1-A809-CF5E7D0098BC}"/>
+                    <a16:creationId xmlns="" xmlns:a16="http://schemas.microsoft.com/office/drawing/2014/main" id="{C4067397-9313-4DE1-A809-CF5E7D0098BC}"/>
                   </a:ext>
                 </a:extLst>
               </p:cNvPr>
@@ -5572,7 +5797,7 @@
               <p:cNvPr id="20" name="Rectangle 19">
                 <a:extLst>
                   <a:ext uri="{FF2B5EF4-FFF2-40B4-BE49-F238E27FC236}">
-                    <a16:creationId xmlns:a16="http://schemas.microsoft.com/office/drawing/2014/main" xmlns="" id="{AB49AFCD-2588-4EF9-B5B4-3D913638683C}"/>
+                    <a16:creationId xmlns="" xmlns:a16="http://schemas.microsoft.com/office/drawing/2014/main" id="{AB49AFCD-2588-4EF9-B5B4-3D913638683C}"/>
                   </a:ext>
                 </a:extLst>
               </p:cNvPr>
@@ -5726,7 +5951,7 @@
               <p:cNvPr id="21" name="Rectangle 20">
                 <a:extLst>
                   <a:ext uri="{FF2B5EF4-FFF2-40B4-BE49-F238E27FC236}">
-                    <a16:creationId xmlns:a16="http://schemas.microsoft.com/office/drawing/2014/main" xmlns="" id="{C2E4332A-8690-42CA-BBF4-D561B1BD979B}"/>
+                    <a16:creationId xmlns="" xmlns:a16="http://schemas.microsoft.com/office/drawing/2014/main" id="{C2E4332A-8690-42CA-BBF4-D561B1BD979B}"/>
                   </a:ext>
                 </a:extLst>
               </p:cNvPr>
@@ -5883,7 +6108,7 @@
               <p:cNvPr id="22" name="Rectangle 21">
                 <a:extLst>
                   <a:ext uri="{FF2B5EF4-FFF2-40B4-BE49-F238E27FC236}">
-                    <a16:creationId xmlns:a16="http://schemas.microsoft.com/office/drawing/2014/main" xmlns="" id="{988CE560-CC28-429D-BD4D-7F4150021676}"/>
+                    <a16:creationId xmlns="" xmlns:a16="http://schemas.microsoft.com/office/drawing/2014/main" id="{988CE560-CC28-429D-BD4D-7F4150021676}"/>
                   </a:ext>
                 </a:extLst>
               </p:cNvPr>
@@ -6041,7 +6266,7 @@
               <p:cNvPr id="23" name="Rectangle 22">
                 <a:extLst>
                   <a:ext uri="{FF2B5EF4-FFF2-40B4-BE49-F238E27FC236}">
-                    <a16:creationId xmlns:a16="http://schemas.microsoft.com/office/drawing/2014/main" xmlns="" id="{3A7494E7-3C12-42DE-B3F3-4C65FD864921}"/>
+                    <a16:creationId xmlns="" xmlns:a16="http://schemas.microsoft.com/office/drawing/2014/main" id="{3A7494E7-3C12-42DE-B3F3-4C65FD864921}"/>
                   </a:ext>
                 </a:extLst>
               </p:cNvPr>
@@ -6196,7 +6421,7 @@
             <p:cNvPr id="18" name="Rectangle 17">
               <a:extLst>
                 <a:ext uri="{FF2B5EF4-FFF2-40B4-BE49-F238E27FC236}">
-                  <a16:creationId xmlns:a16="http://schemas.microsoft.com/office/drawing/2014/main" xmlns="" id="{C2E4332A-8690-42CA-BBF4-D561B1BD979B}"/>
+                  <a16:creationId xmlns="" xmlns:a16="http://schemas.microsoft.com/office/drawing/2014/main" id="{C2E4332A-8690-42CA-BBF4-D561B1BD979B}"/>
                 </a:ext>
               </a:extLst>
             </p:cNvPr>
@@ -6380,45 +6605,10 @@
       </p:sp>
       <p:sp>
         <p:nvSpPr>
-          <p:cNvPr id="4" name="Title 3">
-            <a:extLst>
-              <a:ext uri="{FF2B5EF4-FFF2-40B4-BE49-F238E27FC236}">
-                <a16:creationId xmlns:a16="http://schemas.microsoft.com/office/drawing/2014/main" xmlns="" id="{5C35197B-9DF7-4747-AC04-B57581EAFE1E}"/>
-              </a:ext>
-            </a:extLst>
-          </p:cNvPr>
-          <p:cNvSpPr>
-            <a:spLocks noGrp="1"/>
-          </p:cNvSpPr>
-          <p:nvPr>
-            <p:ph type="title"/>
-          </p:nvPr>
-        </p:nvSpPr>
-        <p:spPr>
-          <a:xfrm>
-            <a:off x="0" y="355637"/>
-            <a:ext cx="4066674" cy="689112"/>
-          </a:xfrm>
-        </p:spPr>
-        <p:txBody>
-          <a:bodyPr>
-            <a:normAutofit fontScale="90000"/>
-          </a:bodyPr>
-          <a:lstStyle/>
-          <a:p>
-            <a:r>
-              <a:rPr lang="en-US" dirty="0"/>
-              <a:t>Figure 3. Single-carrier and RZ</a:t>
-            </a:r>
-          </a:p>
-        </p:txBody>
-      </p:sp>
-      <p:sp>
-        <p:nvSpPr>
           <p:cNvPr id="28" name="TextBox 27">
             <a:extLst>
               <a:ext uri="{FF2B5EF4-FFF2-40B4-BE49-F238E27FC236}">
-                <a16:creationId xmlns:a16="http://schemas.microsoft.com/office/drawing/2014/main" xmlns="" id="{32FE0A9E-DEFD-43CC-988C-08D4892C8C47}"/>
+                <a16:creationId xmlns="" xmlns:a16="http://schemas.microsoft.com/office/drawing/2014/main" id="{32FE0A9E-DEFD-43CC-988C-08D4892C8C47}"/>
               </a:ext>
             </a:extLst>
           </p:cNvPr>
@@ -6427,8 +6617,8 @@
         </p:nvSpPr>
         <p:spPr>
           <a:xfrm>
-            <a:off x="4952247" y="693448"/>
-            <a:ext cx="298480" cy="338554"/>
+            <a:off x="926347" y="490248"/>
+            <a:ext cx="436338" cy="338554"/>
           </a:xfrm>
           <a:prstGeom prst="rect">
             <a:avLst/>
@@ -6443,7 +6633,7 @@
           <a:p>
             <a:r>
               <a:rPr lang="en-US" sz="1600" b="1" dirty="0"/>
-              <a:t>a</a:t>
+              <a:t>(a)</a:t>
             </a:r>
           </a:p>
         </p:txBody>
@@ -6453,7 +6643,7 @@
           <p:cNvPr id="29" name="TextBox 28">
             <a:extLst>
               <a:ext uri="{FF2B5EF4-FFF2-40B4-BE49-F238E27FC236}">
-                <a16:creationId xmlns:a16="http://schemas.microsoft.com/office/drawing/2014/main" xmlns="" id="{C419E9B8-14DD-4C8E-9995-62EE9C5A5D87}"/>
+                <a16:creationId xmlns="" xmlns:a16="http://schemas.microsoft.com/office/drawing/2014/main" id="{C419E9B8-14DD-4C8E-9995-62EE9C5A5D87}"/>
               </a:ext>
             </a:extLst>
           </p:cNvPr>
@@ -6462,8 +6652,8 @@
         </p:nvSpPr>
         <p:spPr>
           <a:xfrm>
-            <a:off x="4951879" y="3484749"/>
-            <a:ext cx="309700" cy="338554"/>
+            <a:off x="924452" y="3424387"/>
+            <a:ext cx="447558" cy="338554"/>
           </a:xfrm>
           <a:prstGeom prst="rect">
             <a:avLst/>
@@ -6478,17 +6668,17 @@
           <a:p>
             <a:r>
               <a:rPr lang="en-US" sz="1600" b="1" dirty="0"/>
-              <a:t>b</a:t>
-            </a:r>
-          </a:p>
-        </p:txBody>
-      </p:sp>
-      <p:sp>
-        <p:nvSpPr>
-          <p:cNvPr id="27" name="TextBox 26">
+              <a:t>(b)</a:t>
+            </a:r>
+          </a:p>
+        </p:txBody>
+      </p:sp>
+      <p:sp>
+        <p:nvSpPr>
+          <p:cNvPr id="30" name="TextBox 29">
             <a:extLst>
               <a:ext uri="{FF2B5EF4-FFF2-40B4-BE49-F238E27FC236}">
-                <a16:creationId xmlns:a16="http://schemas.microsoft.com/office/drawing/2014/main" xmlns="" id="{32FE0A9E-DEFD-43CC-988C-08D4892C8C47}"/>
+                <a16:creationId xmlns="" xmlns:a16="http://schemas.microsoft.com/office/drawing/2014/main" id="{32FE0A9E-DEFD-43CC-988C-08D4892C8C47}"/>
               </a:ext>
             </a:extLst>
           </p:cNvPr>
@@ -6497,8 +6687,8 @@
         </p:nvSpPr>
         <p:spPr>
           <a:xfrm>
-            <a:off x="9003507" y="1129656"/>
-            <a:ext cx="298480" cy="338554"/>
+            <a:off x="5245137" y="820114"/>
+            <a:ext cx="436338" cy="338554"/>
           </a:xfrm>
           <a:prstGeom prst="rect">
             <a:avLst/>
@@ -6512,8 +6702,8 @@
           <a:lstStyle/>
           <a:p>
             <a:r>
-              <a:rPr lang="en-US" sz="1600" b="1" dirty="0"/>
-              <a:t>c</a:t>
+              <a:rPr lang="en-US" sz="1600" b="1" dirty="0" smtClean="0"/>
+              <a:t>(c)</a:t>
             </a:r>
             <a:endParaRPr lang="en-US" sz="1600" b="1" dirty="0"/>
           </a:p>
@@ -6521,10 +6711,10 @@
       </p:sp>
       <p:sp>
         <p:nvSpPr>
-          <p:cNvPr id="30" name="TextBox 29">
+          <p:cNvPr id="31" name="TextBox 30">
             <a:extLst>
               <a:ext uri="{FF2B5EF4-FFF2-40B4-BE49-F238E27FC236}">
-                <a16:creationId xmlns:a16="http://schemas.microsoft.com/office/drawing/2014/main" xmlns="" id="{32FE0A9E-DEFD-43CC-988C-08D4892C8C47}"/>
+                <a16:creationId xmlns="" xmlns:a16="http://schemas.microsoft.com/office/drawing/2014/main" id="{32FE0A9E-DEFD-43CC-988C-08D4892C8C47}"/>
               </a:ext>
             </a:extLst>
           </p:cNvPr>
@@ -6533,8 +6723,8 @@
         </p:nvSpPr>
         <p:spPr>
           <a:xfrm>
-            <a:off x="9003507" y="3588695"/>
-            <a:ext cx="309700" cy="338554"/>
+            <a:off x="5058166" y="3389461"/>
+            <a:ext cx="447558" cy="338554"/>
           </a:xfrm>
           <a:prstGeom prst="rect">
             <a:avLst/>
@@ -6548,8 +6738,8 @@
           <a:lstStyle/>
           <a:p>
             <a:r>
-              <a:rPr lang="en-US" sz="1600" b="1" dirty="0"/>
-              <a:t>d</a:t>
+              <a:rPr lang="en-US" sz="1600" b="1" dirty="0" smtClean="0"/>
+              <a:t>(d)</a:t>
             </a:r>
             <a:endParaRPr lang="en-US" sz="1600" b="1" dirty="0"/>
           </a:p>
@@ -6590,7 +6780,7 @@
           <p:cNvPr id="17" name="Picture 16">
             <a:extLst>
               <a:ext uri="{FF2B5EF4-FFF2-40B4-BE49-F238E27FC236}">
-                <a16:creationId xmlns:a16="http://schemas.microsoft.com/office/drawing/2014/main" xmlns="" id="{D1C25AFA-E5F3-48A9-9D82-AC3E77FEB83B}"/>
+                <a16:creationId xmlns="" xmlns:a16="http://schemas.microsoft.com/office/drawing/2014/main" id="{D1C25AFA-E5F3-48A9-9D82-AC3E77FEB83B}"/>
               </a:ext>
             </a:extLst>
           </p:cNvPr>
@@ -6620,7 +6810,7 @@
           <p:cNvPr id="2" name="Title 1">
             <a:extLst>
               <a:ext uri="{FF2B5EF4-FFF2-40B4-BE49-F238E27FC236}">
-                <a16:creationId xmlns:a16="http://schemas.microsoft.com/office/drawing/2014/main" xmlns="" id="{EBC35852-A6FE-431B-AFF6-C27E4847D9B5}"/>
+                <a16:creationId xmlns="" xmlns:a16="http://schemas.microsoft.com/office/drawing/2014/main" id="{EBC35852-A6FE-431B-AFF6-C27E4847D9B5}"/>
               </a:ext>
             </a:extLst>
           </p:cNvPr>
@@ -6676,7 +6866,7 @@
           <p:cNvPr id="14" name="TextBox 13">
             <a:extLst>
               <a:ext uri="{FF2B5EF4-FFF2-40B4-BE49-F238E27FC236}">
-                <a16:creationId xmlns:a16="http://schemas.microsoft.com/office/drawing/2014/main" xmlns="" id="{E809E2F2-9D33-49C9-8564-2FEAF7A5BA96}"/>
+                <a16:creationId xmlns="" xmlns:a16="http://schemas.microsoft.com/office/drawing/2014/main" id="{E809E2F2-9D33-49C9-8564-2FEAF7A5BA96}"/>
               </a:ext>
             </a:extLst>
           </p:cNvPr>
@@ -6685,8 +6875,8 @@
         </p:nvSpPr>
         <p:spPr>
           <a:xfrm>
-            <a:off x="228916" y="937367"/>
-            <a:ext cx="298480" cy="338554"/>
+            <a:off x="748871" y="1116661"/>
+            <a:ext cx="436338" cy="338554"/>
           </a:xfrm>
           <a:prstGeom prst="rect">
             <a:avLst/>
@@ -6701,7 +6891,7 @@
           <a:p>
             <a:r>
               <a:rPr lang="en-US" sz="1600" b="1" dirty="0"/>
-              <a:t>a</a:t>
+              <a:t>(a)</a:t>
             </a:r>
           </a:p>
         </p:txBody>
@@ -6711,7 +6901,7 @@
           <p:cNvPr id="15" name="TextBox 14">
             <a:extLst>
               <a:ext uri="{FF2B5EF4-FFF2-40B4-BE49-F238E27FC236}">
-                <a16:creationId xmlns:a16="http://schemas.microsoft.com/office/drawing/2014/main" xmlns="" id="{DAC54527-D211-4C3F-8491-052606155A80}"/>
+                <a16:creationId xmlns="" xmlns:a16="http://schemas.microsoft.com/office/drawing/2014/main" id="{DAC54527-D211-4C3F-8491-052606155A80}"/>
               </a:ext>
             </a:extLst>
           </p:cNvPr>
@@ -6720,8 +6910,8 @@
         </p:nvSpPr>
         <p:spPr>
           <a:xfrm>
-            <a:off x="2155426" y="937367"/>
-            <a:ext cx="309700" cy="338554"/>
+            <a:off x="2747098" y="1116661"/>
+            <a:ext cx="447558" cy="338554"/>
           </a:xfrm>
           <a:prstGeom prst="rect">
             <a:avLst/>
@@ -6736,7 +6926,7 @@
           <a:p>
             <a:r>
               <a:rPr lang="en-US" sz="1600" b="1" dirty="0"/>
-              <a:t>b</a:t>
+              <a:t>(b)</a:t>
             </a:r>
           </a:p>
         </p:txBody>
@@ -6776,7 +6966,7 @@
           <p:cNvPr id="2" name="Rectangle 1">
             <a:extLst>
               <a:ext uri="{FF2B5EF4-FFF2-40B4-BE49-F238E27FC236}">
-                <a16:creationId xmlns:a16="http://schemas.microsoft.com/office/drawing/2014/main" xmlns="" id="{74C8D738-4703-4763-8415-861B6DB40439}"/>
+                <a16:creationId xmlns="" xmlns:a16="http://schemas.microsoft.com/office/drawing/2014/main" id="{74C8D738-4703-4763-8415-861B6DB40439}"/>
               </a:ext>
             </a:extLst>
           </p:cNvPr>
@@ -6822,7 +7012,7 @@
           <a:p>
             <a:pPr algn="ctr"/>
             <a:r>
-              <a:rPr lang="en-US" sz="1600" dirty="0">
+              <a:rPr lang="en-US" dirty="0">
                 <a:solidFill>
                   <a:schemeClr val="tx1"/>
                 </a:solidFill>
@@ -6837,7 +7027,7 @@
           <p:cNvPr id="3" name="Rectangle 2">
             <a:extLst>
               <a:ext uri="{FF2B5EF4-FFF2-40B4-BE49-F238E27FC236}">
-                <a16:creationId xmlns:a16="http://schemas.microsoft.com/office/drawing/2014/main" xmlns="" id="{622ABEC3-B4B8-4DB5-830A-48A9891BC2DF}"/>
+                <a16:creationId xmlns="" xmlns:a16="http://schemas.microsoft.com/office/drawing/2014/main" id="{622ABEC3-B4B8-4DB5-830A-48A9891BC2DF}"/>
               </a:ext>
             </a:extLst>
           </p:cNvPr>
@@ -6898,7 +7088,7 @@
           <p:cNvPr id="4" name="TextBox 3">
             <a:extLst>
               <a:ext uri="{FF2B5EF4-FFF2-40B4-BE49-F238E27FC236}">
-                <a16:creationId xmlns:a16="http://schemas.microsoft.com/office/drawing/2014/main" xmlns="" id="{8D88AB86-D576-4E22-844E-B654CAFD0686}"/>
+                <a16:creationId xmlns="" xmlns:a16="http://schemas.microsoft.com/office/drawing/2014/main" id="{8D88AB86-D576-4E22-844E-B654CAFD0686}"/>
               </a:ext>
             </a:extLst>
           </p:cNvPr>
@@ -6933,7 +7123,7 @@
           <p:cNvPr id="5" name="TextBox 4">
             <a:extLst>
               <a:ext uri="{FF2B5EF4-FFF2-40B4-BE49-F238E27FC236}">
-                <a16:creationId xmlns:a16="http://schemas.microsoft.com/office/drawing/2014/main" xmlns="" id="{0C780F7F-ED25-4BC8-8B7F-6300EA403814}"/>
+                <a16:creationId xmlns="" xmlns:a16="http://schemas.microsoft.com/office/drawing/2014/main" id="{0C780F7F-ED25-4BC8-8B7F-6300EA403814}"/>
               </a:ext>
             </a:extLst>
           </p:cNvPr>
@@ -6968,7 +7158,7 @@
           <p:cNvPr id="6" name="TextBox 5">
             <a:extLst>
               <a:ext uri="{FF2B5EF4-FFF2-40B4-BE49-F238E27FC236}">
-                <a16:creationId xmlns:a16="http://schemas.microsoft.com/office/drawing/2014/main" xmlns="" id="{64015AE9-3025-4B9F-AD5E-6D44B25A07F9}"/>
+                <a16:creationId xmlns="" xmlns:a16="http://schemas.microsoft.com/office/drawing/2014/main" id="{64015AE9-3025-4B9F-AD5E-6D44B25A07F9}"/>
               </a:ext>
             </a:extLst>
           </p:cNvPr>
@@ -7003,7 +7193,7 @@
           <p:cNvPr id="7" name="TextBox 6">
             <a:extLst>
               <a:ext uri="{FF2B5EF4-FFF2-40B4-BE49-F238E27FC236}">
-                <a16:creationId xmlns:a16="http://schemas.microsoft.com/office/drawing/2014/main" xmlns="" id="{AB2A36C5-1E5A-4B9B-826C-315932DB924B}"/>
+                <a16:creationId xmlns="" xmlns:a16="http://schemas.microsoft.com/office/drawing/2014/main" id="{AB2A36C5-1E5A-4B9B-826C-315932DB924B}"/>
               </a:ext>
             </a:extLst>
           </p:cNvPr>
@@ -7038,7 +7228,7 @@
           <p:cNvPr id="8" name="Rectangle 7">
             <a:extLst>
               <a:ext uri="{FF2B5EF4-FFF2-40B4-BE49-F238E27FC236}">
-                <a16:creationId xmlns:a16="http://schemas.microsoft.com/office/drawing/2014/main" xmlns="" id="{5E4194FA-7901-40C5-89DC-59D34F3B616A}"/>
+                <a16:creationId xmlns="" xmlns:a16="http://schemas.microsoft.com/office/drawing/2014/main" id="{5E4194FA-7901-40C5-89DC-59D34F3B616A}"/>
               </a:ext>
             </a:extLst>
           </p:cNvPr>
@@ -7101,7 +7291,7 @@
           <p:cNvPr id="9" name="TextBox 8">
             <a:extLst>
               <a:ext uri="{FF2B5EF4-FFF2-40B4-BE49-F238E27FC236}">
-                <a16:creationId xmlns:a16="http://schemas.microsoft.com/office/drawing/2014/main" xmlns="" id="{C96778A5-88F4-441F-A4CD-E18090121843}"/>
+                <a16:creationId xmlns="" xmlns:a16="http://schemas.microsoft.com/office/drawing/2014/main" id="{C96778A5-88F4-441F-A4CD-E18090121843}"/>
               </a:ext>
             </a:extLst>
           </p:cNvPr>
@@ -7136,7 +7326,7 @@
           <p:cNvPr id="10" name="TextBox 9">
             <a:extLst>
               <a:ext uri="{FF2B5EF4-FFF2-40B4-BE49-F238E27FC236}">
-                <a16:creationId xmlns:a16="http://schemas.microsoft.com/office/drawing/2014/main" xmlns="" id="{3FBD810A-743B-44D4-A9B4-A5ADE75E2664}"/>
+                <a16:creationId xmlns="" xmlns:a16="http://schemas.microsoft.com/office/drawing/2014/main" id="{3FBD810A-743B-44D4-A9B4-A5ADE75E2664}"/>
               </a:ext>
             </a:extLst>
           </p:cNvPr>
@@ -7171,7 +7361,7 @@
           <p:cNvPr id="11" name="Rectangle 10">
             <a:extLst>
               <a:ext uri="{FF2B5EF4-FFF2-40B4-BE49-F238E27FC236}">
-                <a16:creationId xmlns:a16="http://schemas.microsoft.com/office/drawing/2014/main" xmlns="" id="{13FCBEC6-3478-4D7E-976A-3308AA1BE0D3}"/>
+                <a16:creationId xmlns="" xmlns:a16="http://schemas.microsoft.com/office/drawing/2014/main" id="{13FCBEC6-3478-4D7E-976A-3308AA1BE0D3}"/>
               </a:ext>
             </a:extLst>
           </p:cNvPr>
@@ -7217,7 +7407,7 @@
           <a:p>
             <a:pPr algn="ctr"/>
             <a:r>
-              <a:rPr lang="en-US" sz="1600" dirty="0">
+              <a:rPr lang="en-US" dirty="0">
                 <a:solidFill>
                   <a:schemeClr val="tx1"/>
                 </a:solidFill>
@@ -7232,7 +7422,7 @@
           <p:cNvPr id="12" name="TextBox 11">
             <a:extLst>
               <a:ext uri="{FF2B5EF4-FFF2-40B4-BE49-F238E27FC236}">
-                <a16:creationId xmlns:a16="http://schemas.microsoft.com/office/drawing/2014/main" xmlns="" id="{5E2A12E6-6A2F-4B26-8BB6-00643F2511BC}"/>
+                <a16:creationId xmlns="" xmlns:a16="http://schemas.microsoft.com/office/drawing/2014/main" id="{5E2A12E6-6A2F-4B26-8BB6-00643F2511BC}"/>
               </a:ext>
             </a:extLst>
           </p:cNvPr>
@@ -7267,7 +7457,7 @@
           <p:cNvPr id="13" name="TextBox 12">
             <a:extLst>
               <a:ext uri="{FF2B5EF4-FFF2-40B4-BE49-F238E27FC236}">
-                <a16:creationId xmlns:a16="http://schemas.microsoft.com/office/drawing/2014/main" xmlns="" id="{9CD699A6-44D9-4CD3-B05D-504882B1AEFB}"/>
+                <a16:creationId xmlns="" xmlns:a16="http://schemas.microsoft.com/office/drawing/2014/main" id="{9CD699A6-44D9-4CD3-B05D-504882B1AEFB}"/>
               </a:ext>
             </a:extLst>
           </p:cNvPr>
@@ -7302,7 +7492,7 @@
           <p:cNvPr id="14" name="TextBox 13">
             <a:extLst>
               <a:ext uri="{FF2B5EF4-FFF2-40B4-BE49-F238E27FC236}">
-                <a16:creationId xmlns:a16="http://schemas.microsoft.com/office/drawing/2014/main" xmlns="" id="{FE7EB4D7-C726-4740-A57B-0F61F60FBDAD}"/>
+                <a16:creationId xmlns="" xmlns:a16="http://schemas.microsoft.com/office/drawing/2014/main" id="{FE7EB4D7-C726-4740-A57B-0F61F60FBDAD}"/>
               </a:ext>
             </a:extLst>
           </p:cNvPr>
@@ -7345,7 +7535,7 @@
           <p:cNvPr id="15" name="TextBox 14">
             <a:extLst>
               <a:ext uri="{FF2B5EF4-FFF2-40B4-BE49-F238E27FC236}">
-                <a16:creationId xmlns:a16="http://schemas.microsoft.com/office/drawing/2014/main" xmlns="" id="{3D545D7D-0B3D-4641-A294-0166CB1135C7}"/>
+                <a16:creationId xmlns="" xmlns:a16="http://schemas.microsoft.com/office/drawing/2014/main" id="{3D545D7D-0B3D-4641-A294-0166CB1135C7}"/>
               </a:ext>
             </a:extLst>
           </p:cNvPr>
@@ -7388,7 +7578,7 @@
           <p:cNvPr id="16" name="Group 15">
             <a:extLst>
               <a:ext uri="{FF2B5EF4-FFF2-40B4-BE49-F238E27FC236}">
-                <a16:creationId xmlns:a16="http://schemas.microsoft.com/office/drawing/2014/main" xmlns="" id="{F5F7C1D0-86C8-458B-B079-B5C775758DA9}"/>
+                <a16:creationId xmlns="" xmlns:a16="http://schemas.microsoft.com/office/drawing/2014/main" id="{F5F7C1D0-86C8-458B-B079-B5C775758DA9}"/>
               </a:ext>
             </a:extLst>
           </p:cNvPr>
@@ -7408,7 +7598,7 @@
             <p:cNvPr id="17" name="Rectangle 16">
               <a:extLst>
                 <a:ext uri="{FF2B5EF4-FFF2-40B4-BE49-F238E27FC236}">
-                  <a16:creationId xmlns:a16="http://schemas.microsoft.com/office/drawing/2014/main" xmlns="" id="{57ED1AAD-6EC7-4FFF-BC6B-F2507C04443A}"/>
+                  <a16:creationId xmlns="" xmlns:a16="http://schemas.microsoft.com/office/drawing/2014/main" id="{57ED1AAD-6EC7-4FFF-BC6B-F2507C04443A}"/>
                 </a:ext>
               </a:extLst>
             </p:cNvPr>
@@ -7506,7 +7696,7 @@
             <p:cNvPr id="18" name="TextBox 17">
               <a:extLst>
                 <a:ext uri="{FF2B5EF4-FFF2-40B4-BE49-F238E27FC236}">
-                  <a16:creationId xmlns:a16="http://schemas.microsoft.com/office/drawing/2014/main" xmlns="" id="{565A81E6-844B-469A-BB0E-D203D171B7D6}"/>
+                  <a16:creationId xmlns="" xmlns:a16="http://schemas.microsoft.com/office/drawing/2014/main" id="{565A81E6-844B-469A-BB0E-D203D171B7D6}"/>
                 </a:ext>
               </a:extLst>
             </p:cNvPr>
@@ -7541,7 +7731,7 @@
             <p:cNvPr id="19" name="TextBox 18">
               <a:extLst>
                 <a:ext uri="{FF2B5EF4-FFF2-40B4-BE49-F238E27FC236}">
-                  <a16:creationId xmlns:a16="http://schemas.microsoft.com/office/drawing/2014/main" xmlns="" id="{30A61A4D-600B-4650-82EA-2955A89FF80D}"/>
+                  <a16:creationId xmlns="" xmlns:a16="http://schemas.microsoft.com/office/drawing/2014/main" id="{30A61A4D-600B-4650-82EA-2955A89FF80D}"/>
                 </a:ext>
               </a:extLst>
             </p:cNvPr>
@@ -7576,7 +7766,7 @@
             <p:cNvPr id="20" name="TextBox 19">
               <a:extLst>
                 <a:ext uri="{FF2B5EF4-FFF2-40B4-BE49-F238E27FC236}">
-                  <a16:creationId xmlns:a16="http://schemas.microsoft.com/office/drawing/2014/main" xmlns="" id="{58EF5377-1388-48B5-8F45-AD81671C217B}"/>
+                  <a16:creationId xmlns="" xmlns:a16="http://schemas.microsoft.com/office/drawing/2014/main" id="{58EF5377-1388-48B5-8F45-AD81671C217B}"/>
                 </a:ext>
               </a:extLst>
             </p:cNvPr>
@@ -7620,7 +7810,7 @@
           <p:cNvPr id="21" name="TextBox 20">
             <a:extLst>
               <a:ext uri="{FF2B5EF4-FFF2-40B4-BE49-F238E27FC236}">
-                <a16:creationId xmlns:a16="http://schemas.microsoft.com/office/drawing/2014/main" xmlns="" id="{D6D18A25-6DA8-4E92-BD8F-4A9E5D2019FD}"/>
+                <a16:creationId xmlns="" xmlns:a16="http://schemas.microsoft.com/office/drawing/2014/main" id="{D6D18A25-6DA8-4E92-BD8F-4A9E5D2019FD}"/>
               </a:ext>
             </a:extLst>
           </p:cNvPr>
@@ -7663,7 +7853,7 @@
           <p:cNvPr id="22" name="TextBox 21">
             <a:extLst>
               <a:ext uri="{FF2B5EF4-FFF2-40B4-BE49-F238E27FC236}">
-                <a16:creationId xmlns:a16="http://schemas.microsoft.com/office/drawing/2014/main" xmlns="" id="{6D57AC93-1C09-4735-A7A0-85AEC9C23E04}"/>
+                <a16:creationId xmlns="" xmlns:a16="http://schemas.microsoft.com/office/drawing/2014/main" id="{6D57AC93-1C09-4735-A7A0-85AEC9C23E04}"/>
               </a:ext>
             </a:extLst>
           </p:cNvPr>
@@ -7706,7 +7896,7 @@
           <p:cNvPr id="23" name="Straight Arrow Connector 22">
             <a:extLst>
               <a:ext uri="{FF2B5EF4-FFF2-40B4-BE49-F238E27FC236}">
-                <a16:creationId xmlns:a16="http://schemas.microsoft.com/office/drawing/2014/main" xmlns="" id="{A12AA81B-D1F7-45DE-85FF-8EAFD4B015FA}"/>
+                <a16:creationId xmlns="" xmlns:a16="http://schemas.microsoft.com/office/drawing/2014/main" id="{A12AA81B-D1F7-45DE-85FF-8EAFD4B015FA}"/>
               </a:ext>
             </a:extLst>
           </p:cNvPr>
@@ -7750,7 +7940,7 @@
           <p:cNvPr id="24" name="Straight Connector 23">
             <a:extLst>
               <a:ext uri="{FF2B5EF4-FFF2-40B4-BE49-F238E27FC236}">
-                <a16:creationId xmlns:a16="http://schemas.microsoft.com/office/drawing/2014/main" xmlns="" id="{7664B637-41C9-4FB7-AF01-712905657715}"/>
+                <a16:creationId xmlns="" xmlns:a16="http://schemas.microsoft.com/office/drawing/2014/main" id="{7664B637-41C9-4FB7-AF01-712905657715}"/>
               </a:ext>
             </a:extLst>
           </p:cNvPr>
@@ -7793,7 +7983,7 @@
           <p:cNvPr id="25" name="Straight Connector 24">
             <a:extLst>
               <a:ext uri="{FF2B5EF4-FFF2-40B4-BE49-F238E27FC236}">
-                <a16:creationId xmlns:a16="http://schemas.microsoft.com/office/drawing/2014/main" xmlns="" id="{1C1D5D8B-7B9E-4585-8240-4F398FF31F1D}"/>
+                <a16:creationId xmlns="" xmlns:a16="http://schemas.microsoft.com/office/drawing/2014/main" id="{1C1D5D8B-7B9E-4585-8240-4F398FF31F1D}"/>
               </a:ext>
             </a:extLst>
           </p:cNvPr>
@@ -7836,7 +8026,7 @@
           <p:cNvPr id="26" name="Straight Connector 25">
             <a:extLst>
               <a:ext uri="{FF2B5EF4-FFF2-40B4-BE49-F238E27FC236}">
-                <a16:creationId xmlns:a16="http://schemas.microsoft.com/office/drawing/2014/main" xmlns="" id="{10A1A081-C6FB-430E-BF1C-79C79B261BCE}"/>
+                <a16:creationId xmlns="" xmlns:a16="http://schemas.microsoft.com/office/drawing/2014/main" id="{10A1A081-C6FB-430E-BF1C-79C79B261BCE}"/>
               </a:ext>
             </a:extLst>
           </p:cNvPr>
@@ -7879,7 +8069,7 @@
           <p:cNvPr id="27" name="TextBox 26">
             <a:extLst>
               <a:ext uri="{FF2B5EF4-FFF2-40B4-BE49-F238E27FC236}">
-                <a16:creationId xmlns:a16="http://schemas.microsoft.com/office/drawing/2014/main" xmlns="" id="{0BCF1AD9-4D54-47CD-805C-6CCD69947ED0}"/>
+                <a16:creationId xmlns="" xmlns:a16="http://schemas.microsoft.com/office/drawing/2014/main" id="{0BCF1AD9-4D54-47CD-805C-6CCD69947ED0}"/>
               </a:ext>
             </a:extLst>
           </p:cNvPr>
@@ -7914,7 +8104,7 @@
           <p:cNvPr id="28" name="TextBox 27">
             <a:extLst>
               <a:ext uri="{FF2B5EF4-FFF2-40B4-BE49-F238E27FC236}">
-                <a16:creationId xmlns:a16="http://schemas.microsoft.com/office/drawing/2014/main" xmlns="" id="{BAE12875-2C10-414B-9D8C-5DC558AD59E1}"/>
+                <a16:creationId xmlns="" xmlns:a16="http://schemas.microsoft.com/office/drawing/2014/main" id="{BAE12875-2C10-414B-9D8C-5DC558AD59E1}"/>
               </a:ext>
             </a:extLst>
           </p:cNvPr>
@@ -7949,7 +8139,7 @@
           <p:cNvPr id="29" name="Straight Connector 28">
             <a:extLst>
               <a:ext uri="{FF2B5EF4-FFF2-40B4-BE49-F238E27FC236}">
-                <a16:creationId xmlns:a16="http://schemas.microsoft.com/office/drawing/2014/main" xmlns="" id="{05062578-FE9D-4DF3-B01E-70C3E815FEE4}"/>
+                <a16:creationId xmlns="" xmlns:a16="http://schemas.microsoft.com/office/drawing/2014/main" id="{05062578-FE9D-4DF3-B01E-70C3E815FEE4}"/>
               </a:ext>
             </a:extLst>
           </p:cNvPr>
@@ -7992,7 +8182,7 @@
           <p:cNvPr id="30" name="TextBox 29">
             <a:extLst>
               <a:ext uri="{FF2B5EF4-FFF2-40B4-BE49-F238E27FC236}">
-                <a16:creationId xmlns:a16="http://schemas.microsoft.com/office/drawing/2014/main" xmlns="" id="{AFACA7BF-0069-4DF6-9A3D-A37BE6ADE56D}"/>
+                <a16:creationId xmlns="" xmlns:a16="http://schemas.microsoft.com/office/drawing/2014/main" id="{AFACA7BF-0069-4DF6-9A3D-A37BE6ADE56D}"/>
               </a:ext>
             </a:extLst>
           </p:cNvPr>
@@ -8027,7 +8217,7 @@
           <p:cNvPr id="31" name="TextBox 30">
             <a:extLst>
               <a:ext uri="{FF2B5EF4-FFF2-40B4-BE49-F238E27FC236}">
-                <a16:creationId xmlns:a16="http://schemas.microsoft.com/office/drawing/2014/main" xmlns="" id="{1BE03ADE-2A6A-475B-A7A0-B91F77484FAB}"/>
+                <a16:creationId xmlns="" xmlns:a16="http://schemas.microsoft.com/office/drawing/2014/main" id="{1BE03ADE-2A6A-475B-A7A0-B91F77484FAB}"/>
               </a:ext>
             </a:extLst>
           </p:cNvPr>
@@ -8062,7 +8252,7 @@
           <p:cNvPr id="32" name="TextBox 31">
             <a:extLst>
               <a:ext uri="{FF2B5EF4-FFF2-40B4-BE49-F238E27FC236}">
-                <a16:creationId xmlns:a16="http://schemas.microsoft.com/office/drawing/2014/main" xmlns="" id="{3A6AC499-42F9-4600-BE2C-F39CEB338DD1}"/>
+                <a16:creationId xmlns="" xmlns:a16="http://schemas.microsoft.com/office/drawing/2014/main" id="{3A6AC499-42F9-4600-BE2C-F39CEB338DD1}"/>
               </a:ext>
             </a:extLst>
           </p:cNvPr>
@@ -8097,7 +8287,7 @@
           <p:cNvPr id="33" name="Group 32">
             <a:extLst>
               <a:ext uri="{FF2B5EF4-FFF2-40B4-BE49-F238E27FC236}">
-                <a16:creationId xmlns:a16="http://schemas.microsoft.com/office/drawing/2014/main" xmlns="" id="{52DC638F-49D2-4DFF-8C9B-312F5C7B58F6}"/>
+                <a16:creationId xmlns="" xmlns:a16="http://schemas.microsoft.com/office/drawing/2014/main" id="{52DC638F-49D2-4DFF-8C9B-312F5C7B58F6}"/>
               </a:ext>
             </a:extLst>
           </p:cNvPr>
@@ -8117,7 +8307,7 @@
             <p:cNvPr id="34" name="Rectangle 33">
               <a:extLst>
                 <a:ext uri="{FF2B5EF4-FFF2-40B4-BE49-F238E27FC236}">
-                  <a16:creationId xmlns:a16="http://schemas.microsoft.com/office/drawing/2014/main" xmlns="" id="{2B446E99-8182-4940-B615-3E68FA1A00E4}"/>
+                  <a16:creationId xmlns="" xmlns:a16="http://schemas.microsoft.com/office/drawing/2014/main" id="{2B446E99-8182-4940-B615-3E68FA1A00E4}"/>
                 </a:ext>
               </a:extLst>
             </p:cNvPr>
@@ -8180,7 +8370,7 @@
             <p:cNvPr id="35" name="Rectangle 34">
               <a:extLst>
                 <a:ext uri="{FF2B5EF4-FFF2-40B4-BE49-F238E27FC236}">
-                  <a16:creationId xmlns:a16="http://schemas.microsoft.com/office/drawing/2014/main" xmlns="" id="{279FA8DC-2DFF-4818-BB54-699648E4C230}"/>
+                  <a16:creationId xmlns="" xmlns:a16="http://schemas.microsoft.com/office/drawing/2014/main" id="{279FA8DC-2DFF-4818-BB54-699648E4C230}"/>
                 </a:ext>
               </a:extLst>
             </p:cNvPr>
@@ -8280,7 +8470,7 @@
             <p:cNvPr id="36" name="Rectangle 35">
               <a:extLst>
                 <a:ext uri="{FF2B5EF4-FFF2-40B4-BE49-F238E27FC236}">
-                  <a16:creationId xmlns:a16="http://schemas.microsoft.com/office/drawing/2014/main" xmlns="" id="{EC4C8143-71AE-4391-A424-66C7F121AC8B}"/>
+                  <a16:creationId xmlns="" xmlns:a16="http://schemas.microsoft.com/office/drawing/2014/main" id="{EC4C8143-71AE-4391-A424-66C7F121AC8B}"/>
                 </a:ext>
               </a:extLst>
             </p:cNvPr>
@@ -8344,7 +8534,7 @@
             <p:cNvPr id="37" name="Rectangle 36">
               <a:extLst>
                 <a:ext uri="{FF2B5EF4-FFF2-40B4-BE49-F238E27FC236}">
-                  <a16:creationId xmlns:a16="http://schemas.microsoft.com/office/drawing/2014/main" xmlns="" id="{1C0ABDED-77A1-4DB5-8C7A-665B173EB6CC}"/>
+                  <a16:creationId xmlns="" xmlns:a16="http://schemas.microsoft.com/office/drawing/2014/main" id="{1C0ABDED-77A1-4DB5-8C7A-665B173EB6CC}"/>
                 </a:ext>
               </a:extLst>
             </p:cNvPr>
@@ -8404,7 +8594,7 @@
             <p:cNvPr id="38" name="Rectangle 37">
               <a:extLst>
                 <a:ext uri="{FF2B5EF4-FFF2-40B4-BE49-F238E27FC236}">
-                  <a16:creationId xmlns:a16="http://schemas.microsoft.com/office/drawing/2014/main" xmlns="" id="{7A7A5586-F0C8-4AC3-A356-E8577182EB09}"/>
+                  <a16:creationId xmlns="" xmlns:a16="http://schemas.microsoft.com/office/drawing/2014/main" id="{7A7A5586-F0C8-4AC3-A356-E8577182EB09}"/>
                 </a:ext>
               </a:extLst>
             </p:cNvPr>
@@ -8527,13 +8717,13 @@
         </p:nvPicPr>
         <p:blipFill rotWithShape="1">
           <a:blip r:embed="rId3"/>
-          <a:srcRect t="794" b="1155"/>
+          <a:srcRect t="1467" b="2614"/>
           <a:stretch/>
         </p:blipFill>
         <p:spPr>
           <a:xfrm>
-            <a:off x="281894" y="1070920"/>
-            <a:ext cx="5648325" cy="4959178"/>
+            <a:off x="281894" y="1104900"/>
+            <a:ext cx="5648325" cy="4851400"/>
           </a:xfrm>
           <a:prstGeom prst="rect">
             <a:avLst/>
@@ -8545,7 +8735,7 @@
           <p:cNvPr id="2" name="Title 1">
             <a:extLst>
               <a:ext uri="{FF2B5EF4-FFF2-40B4-BE49-F238E27FC236}">
-                <a16:creationId xmlns:a16="http://schemas.microsoft.com/office/drawing/2014/main" xmlns="" id="{2F3206ED-E35E-1045-93C4-2154C90BC077}"/>
+                <a16:creationId xmlns="" xmlns:a16="http://schemas.microsoft.com/office/drawing/2014/main" id="{2F3206ED-E35E-1045-93C4-2154C90BC077}"/>
               </a:ext>
             </a:extLst>
           </p:cNvPr>
@@ -8576,8 +8766,8 @@
         </p:nvSpPr>
         <p:spPr>
           <a:xfrm>
-            <a:off x="965360" y="1680538"/>
-            <a:ext cx="312906" cy="369332"/>
+            <a:off x="899456" y="1680538"/>
+            <a:ext cx="466794" cy="369332"/>
           </a:xfrm>
           <a:prstGeom prst="rect">
             <a:avLst/>
@@ -8591,10 +8781,9 @@
           <a:lstStyle/>
           <a:p>
             <a:r>
-              <a:rPr lang="en-US" b="1" dirty="0" smtClean="0"/>
-              <a:t>a</a:t>
-            </a:r>
-            <a:endParaRPr lang="en-US" b="1" dirty="0"/>
+              <a:rPr lang="en-US" b="1" dirty="0"/>
+              <a:t>(a)</a:t>
+            </a:r>
           </a:p>
         </p:txBody>
       </p:sp>
@@ -8607,7 +8796,7 @@
         <p:spPr>
           <a:xfrm>
             <a:off x="7619089" y="1680538"/>
-            <a:ext cx="325730" cy="369332"/>
+            <a:ext cx="479618" cy="369332"/>
           </a:xfrm>
           <a:prstGeom prst="rect">
             <a:avLst/>
@@ -8621,10 +8810,9 @@
           <a:lstStyle/>
           <a:p>
             <a:r>
-              <a:rPr lang="en-US" b="1" dirty="0" smtClean="0"/>
-              <a:t>b</a:t>
-            </a:r>
-            <a:endParaRPr lang="en-US" b="1" dirty="0"/>
+              <a:rPr lang="en-US" b="1" dirty="0"/>
+              <a:t>(b)</a:t>
+            </a:r>
           </a:p>
         </p:txBody>
       </p:sp>
@@ -8663,7 +8851,7 @@
           <p:cNvPr id="2" name="Title 1">
             <a:extLst>
               <a:ext uri="{FF2B5EF4-FFF2-40B4-BE49-F238E27FC236}">
-                <a16:creationId xmlns:a16="http://schemas.microsoft.com/office/drawing/2014/main" xmlns="" id="{CEC638CC-64E3-49C3-BEAD-E991D4F1A0F6}"/>
+                <a16:creationId xmlns="" xmlns:a16="http://schemas.microsoft.com/office/drawing/2014/main" id="{CEC638CC-64E3-49C3-BEAD-E991D4F1A0F6}"/>
               </a:ext>
             </a:extLst>
           </p:cNvPr>
@@ -8693,7 +8881,7 @@
           <p:cNvPr id="7" name="Object 6">
             <a:extLst>
               <a:ext uri="{FF2B5EF4-FFF2-40B4-BE49-F238E27FC236}">
-                <a16:creationId xmlns:a16="http://schemas.microsoft.com/office/drawing/2014/main" xmlns="" id="{F6CA6643-8CB3-4812-9EB4-AD42FBA4F7C1}"/>
+                <a16:creationId xmlns="" xmlns:a16="http://schemas.microsoft.com/office/drawing/2014/main" id="{F6CA6643-8CB3-4812-9EB4-AD42FBA4F7C1}"/>
               </a:ext>
             </a:extLst>
           </p:cNvPr>
@@ -8703,7 +8891,7 @@
           <p:nvPr>
             <p:extLst>
               <p:ext uri="{D42A27DB-BD31-4B8C-83A1-F6EECF244321}">
-                <p14:modId xmlns:p14="http://schemas.microsoft.com/office/powerpoint/2010/main" val="2761176466"/>
+                <p14:modId xmlns:p14="http://schemas.microsoft.com/office/powerpoint/2010/main" val="340934343"/>
               </p:ext>
             </p:extLst>
           </p:nvPr>
@@ -8716,7 +8904,7 @@
           <a:graphicData uri="http://schemas.openxmlformats.org/presentationml/2006/ole">
             <mc:AlternateContent xmlns:mc="http://schemas.openxmlformats.org/markup-compatibility/2006">
               <mc:Choice xmlns:v="urn:schemas-microsoft-com:vml" Requires="v">
-                <p:oleObj spid="_x0000_s6181" name="Graph" r:id="rId3" imgW="2194560" imgH="2916000" progId="Origin50.Graph">
+                <p:oleObj spid="_x0000_s6196" name="Graph" r:id="rId3" imgW="2194560" imgH="2916000" progId="Origin50.Graph">
                   <p:embed/>
                 </p:oleObj>
               </mc:Choice>
@@ -8786,7 +8974,7 @@
           <p:cNvPr id="2" name="Title 1">
             <a:extLst>
               <a:ext uri="{FF2B5EF4-FFF2-40B4-BE49-F238E27FC236}">
-                <a16:creationId xmlns:a16="http://schemas.microsoft.com/office/drawing/2014/main" xmlns="" id="{32E57FE0-7A90-43C0-8772-DDF0668458DB}"/>
+                <a16:creationId xmlns="" xmlns:a16="http://schemas.microsoft.com/office/drawing/2014/main" id="{32E57FE0-7A90-43C0-8772-DDF0668458DB}"/>
               </a:ext>
             </a:extLst>
           </p:cNvPr>
@@ -8814,7 +9002,7 @@
           <p:cNvPr id="3" name="Object 2">
             <a:extLst>
               <a:ext uri="{FF2B5EF4-FFF2-40B4-BE49-F238E27FC236}">
-                <a16:creationId xmlns:a16="http://schemas.microsoft.com/office/drawing/2014/main" xmlns="" id="{D5CEDB79-49FB-489F-A5D9-6B1EA77B11D6}"/>
+                <a16:creationId xmlns="" xmlns:a16="http://schemas.microsoft.com/office/drawing/2014/main" id="{D5CEDB79-49FB-489F-A5D9-6B1EA77B11D6}"/>
               </a:ext>
             </a:extLst>
           </p:cNvPr>
@@ -8837,7 +9025,7 @@
           <a:graphicData uri="http://schemas.openxmlformats.org/presentationml/2006/ole">
             <mc:AlternateContent xmlns:mc="http://schemas.openxmlformats.org/markup-compatibility/2006">
               <mc:Choice xmlns:v="urn:schemas-microsoft-com:vml" Requires="v">
-                <p:oleObj spid="_x0000_s7201" name="Graph" r:id="rId3" imgW="2926080" imgH="2926080" progId="Origin50.Graph">
+                <p:oleObj spid="_x0000_s7216" name="Graph" r:id="rId3" imgW="2926080" imgH="2926080" progId="Origin50.Graph">
                   <p:embed/>
                 </p:oleObj>
               </mc:Choice>
@@ -8849,7 +9037,7 @@
                       <p:cNvPr id="15" name="Object 14">
                         <a:extLst>
                           <a:ext uri="{FF2B5EF4-FFF2-40B4-BE49-F238E27FC236}">
-                            <a16:creationId xmlns:a16="http://schemas.microsoft.com/office/drawing/2014/main" xmlns="" id="{06FDABC7-1AC2-4770-86B2-B8BC12BA6CF9}"/>
+                            <a16:creationId xmlns="" xmlns:a16="http://schemas.microsoft.com/office/drawing/2014/main" id="{06FDABC7-1AC2-4770-86B2-B8BC12BA6CF9}"/>
                           </a:ext>
                         </a:extLst>
                       </p:cNvPr>
@@ -8913,7 +9101,7 @@
           <p:cNvPr id="2" name="Title 1">
             <a:extLst>
               <a:ext uri="{FF2B5EF4-FFF2-40B4-BE49-F238E27FC236}">
-                <a16:creationId xmlns:a16="http://schemas.microsoft.com/office/drawing/2014/main" xmlns="" id="{3537EE33-CFE1-497F-8E44-CEDA87C4C4D4}"/>
+                <a16:creationId xmlns="" xmlns:a16="http://schemas.microsoft.com/office/drawing/2014/main" id="{3537EE33-CFE1-497F-8E44-CEDA87C4C4D4}"/>
               </a:ext>
             </a:extLst>
           </p:cNvPr>
@@ -8941,7 +9129,7 @@
           <p:cNvPr id="4" name="Picture 3">
             <a:extLst>
               <a:ext uri="{FF2B5EF4-FFF2-40B4-BE49-F238E27FC236}">
-                <a16:creationId xmlns:a16="http://schemas.microsoft.com/office/drawing/2014/main" xmlns="" id="{DF3E8FC3-007F-4088-80AC-9BD028EAE7C2}"/>
+                <a16:creationId xmlns="" xmlns:a16="http://schemas.microsoft.com/office/drawing/2014/main" id="{DF3E8FC3-007F-4088-80AC-9BD028EAE7C2}"/>
               </a:ext>
             </a:extLst>
           </p:cNvPr>
@@ -8971,7 +9159,7 @@
           <p:cNvPr id="5" name="Picture 4">
             <a:extLst>
               <a:ext uri="{FF2B5EF4-FFF2-40B4-BE49-F238E27FC236}">
-                <a16:creationId xmlns:a16="http://schemas.microsoft.com/office/drawing/2014/main" xmlns="" id="{4D5B1EE4-E723-40EB-9E6D-7857DF86E7BD}"/>
+                <a16:creationId xmlns="" xmlns:a16="http://schemas.microsoft.com/office/drawing/2014/main" id="{4D5B1EE4-E723-40EB-9E6D-7857DF86E7BD}"/>
               </a:ext>
             </a:extLst>
           </p:cNvPr>

</xml_diff>